<commit_message>
Updates to all Literature
Edited and Finalised Literature Reviews 
Added all Literature used 
Updated SOI Ethics
Updated Poster
Updated IEEE layout with content
</commit_message>
<xml_diff>
--- a/Doc/project-poster-template(IBMC) - WIP.pptx
+++ b/Doc/project-poster-template(IBMC) - WIP.pptx
@@ -898,9 +898,16 @@
         <a:lstStyle/>
         <a:p>
           <a:r>
-            <a:rPr lang="en-US" sz="3600" dirty="0"/>
-            <a:t>Phase I</a:t>
+            <a:rPr lang="en-GB" sz="2400" dirty="0">
+              <a:latin typeface="Dubai Light" panose="020B0303030403030204" pitchFamily="34" charset="-78"/>
+              <a:cs typeface="Dubai Light" panose="020B0303030403030204" pitchFamily="34" charset="-78"/>
+            </a:rPr>
+            <a:t>Insertion of Parameters</a:t>
           </a:r>
+          <a:endParaRPr lang="en-US" sz="2400" dirty="0">
+            <a:latin typeface="Dubai Light" panose="020B0303030403030204" pitchFamily="34" charset="-78"/>
+            <a:cs typeface="Dubai Light" panose="020B0303030403030204" pitchFamily="34" charset="-78"/>
+          </a:endParaRPr>
         </a:p>
       </dgm:t>
     </dgm:pt>
@@ -927,15 +934,18 @@
       </dgm:t>
     </dgm:pt>
     <dgm:pt modelId="{300FCD3E-1ADF-4D8E-8B7F-C23D248E5AA3}">
-      <dgm:prSet phldrT="[Text]"/>
+      <dgm:prSet phldrT="[Text]" custT="1"/>
       <dgm:spPr/>
       <dgm:t>
         <a:bodyPr/>
         <a:lstStyle/>
         <a:p>
           <a:r>
-            <a:rPr lang="en-US" dirty="0"/>
-            <a:t>Phase II</a:t>
+            <a:rPr lang="en-US" sz="2400" dirty="0">
+              <a:latin typeface="Dubai Light" panose="020B0303030403030204" pitchFamily="34" charset="-78"/>
+              <a:cs typeface="Dubai Light" panose="020B0303030403030204" pitchFamily="34" charset="-78"/>
+            </a:rPr>
+            <a:t>Initiate Web Scraping</a:t>
           </a:r>
         </a:p>
       </dgm:t>
@@ -970,10 +980,16 @@
         <a:lstStyle/>
         <a:p>
           <a:r>
-            <a:rPr lang="en-GB" dirty="0"/>
-            <a:t>Phase III</a:t>
+            <a:rPr lang="en-GB" dirty="0">
+              <a:latin typeface="Dubai Light" panose="020B0303030403030204" pitchFamily="34" charset="-78"/>
+              <a:cs typeface="Dubai Light" panose="020B0303030403030204" pitchFamily="34" charset="-78"/>
+            </a:rPr>
+            <a:t>Keying of Data and Tagging Analysis</a:t>
           </a:r>
-          <a:endParaRPr lang="en-US" dirty="0"/>
+          <a:endParaRPr lang="en-US" dirty="0">
+            <a:latin typeface="Dubai Light" panose="020B0303030403030204" pitchFamily="34" charset="-78"/>
+            <a:cs typeface="Dubai Light" panose="020B0303030403030204" pitchFamily="34" charset="-78"/>
+          </a:endParaRPr>
         </a:p>
       </dgm:t>
     </dgm:pt>
@@ -999,6 +1015,49 @@
         </a:p>
       </dgm:t>
     </dgm:pt>
+    <dgm:pt modelId="{E2CF72DC-2E2B-4ED5-BFB7-331C3962E7F7}">
+      <dgm:prSet custT="1"/>
+      <dgm:spPr/>
+      <dgm:t>
+        <a:bodyPr/>
+        <a:lstStyle/>
+        <a:p>
+          <a:r>
+            <a:rPr lang="en-GB" sz="2400" dirty="0">
+              <a:latin typeface="Dubai Light" panose="020B0303030403030204" pitchFamily="34" charset="-78"/>
+              <a:cs typeface="Dubai Light" panose="020B0303030403030204" pitchFamily="34" charset="-78"/>
+            </a:rPr>
+            <a:t>Calculation of Accuracy</a:t>
+          </a:r>
+          <a:endParaRPr lang="en-US" sz="2400" dirty="0">
+            <a:latin typeface="Dubai Light" panose="020B0303030403030204" pitchFamily="34" charset="-78"/>
+            <a:cs typeface="Dubai Light" panose="020B0303030403030204" pitchFamily="34" charset="-78"/>
+          </a:endParaRPr>
+        </a:p>
+      </dgm:t>
+    </dgm:pt>
+    <dgm:pt modelId="{D2346941-9D9D-4E3D-8F0D-4F0C73C8D592}" type="parTrans" cxnId="{BCB0B493-A2FB-4EE2-9DAE-B24E642E4933}">
+      <dgm:prSet/>
+      <dgm:spPr/>
+      <dgm:t>
+        <a:bodyPr/>
+        <a:lstStyle/>
+        <a:p>
+          <a:endParaRPr lang="en-US"/>
+        </a:p>
+      </dgm:t>
+    </dgm:pt>
+    <dgm:pt modelId="{EEBE1EC0-3064-4A16-B333-AF8EE243844B}" type="sibTrans" cxnId="{BCB0B493-A2FB-4EE2-9DAE-B24E642E4933}">
+      <dgm:prSet/>
+      <dgm:spPr/>
+      <dgm:t>
+        <a:bodyPr/>
+        <a:lstStyle/>
+        <a:p>
+          <a:endParaRPr lang="en-US"/>
+        </a:p>
+      </dgm:t>
+    </dgm:pt>
     <dgm:pt modelId="{8C6E4A05-D928-421F-BB35-AB0FFEB0B7C4}" type="pres">
       <dgm:prSet presAssocID="{25AFBC85-EE41-46FB-A7F4-99ED4084C835}" presName="Name0" presStyleCnt="0">
         <dgm:presLayoutVars>
@@ -1012,11 +1071,11 @@
       <dgm:spPr/>
     </dgm:pt>
     <dgm:pt modelId="{BCE78E20-DCE3-4C58-A181-B7224658428D}" type="pres">
-      <dgm:prSet presAssocID="{48328429-D21F-4CF6-9089-EE3F5F57F2AC}" presName="Accent" presStyleLbl="alignAcc1" presStyleIdx="0" presStyleCnt="3"/>
+      <dgm:prSet presAssocID="{48328429-D21F-4CF6-9089-EE3F5F57F2AC}" presName="Accent" presStyleLbl="alignAcc1" presStyleIdx="0" presStyleCnt="4"/>
       <dgm:spPr/>
     </dgm:pt>
     <dgm:pt modelId="{01E68816-0985-4198-A5D3-44721F93E88F}" type="pres">
-      <dgm:prSet presAssocID="{48328429-D21F-4CF6-9089-EE3F5F57F2AC}" presName="Image" presStyleLbl="node1" presStyleIdx="0" presStyleCnt="3" custScaleY="99352"/>
+      <dgm:prSet presAssocID="{48328429-D21F-4CF6-9089-EE3F5F57F2AC}" presName="Image" presStyleLbl="node1" presStyleIdx="0" presStyleCnt="4" custScaleY="99352" custLinFactNeighborX="-2404" custLinFactNeighborY="37595"/>
       <dgm:spPr>
         <a:blipFill>
           <a:blip xmlns:r="http://schemas.openxmlformats.org/officeDocument/2006/relationships" r:embed="rId1" cstate="print">
@@ -1034,7 +1093,7 @@
       </dgm:spPr>
     </dgm:pt>
     <dgm:pt modelId="{0D5A7AA8-00EE-4460-8C06-3AD53B667DDE}" type="pres">
-      <dgm:prSet presAssocID="{48328429-D21F-4CF6-9089-EE3F5F57F2AC}" presName="Child" presStyleLbl="revTx" presStyleIdx="0" presStyleCnt="3">
+      <dgm:prSet presAssocID="{48328429-D21F-4CF6-9089-EE3F5F57F2AC}" presName="Child" presStyleLbl="revTx" presStyleIdx="0" presStyleCnt="4">
         <dgm:presLayoutVars>
           <dgm:bulletEnabled val="1"/>
         </dgm:presLayoutVars>
@@ -1042,7 +1101,7 @@
       <dgm:spPr/>
     </dgm:pt>
     <dgm:pt modelId="{694EF9CD-9C4C-4DF2-B46C-70C927713002}" type="pres">
-      <dgm:prSet presAssocID="{48328429-D21F-4CF6-9089-EE3F5F57F2AC}" presName="Parent" presStyleLbl="alignNode1" presStyleIdx="0" presStyleCnt="3">
+      <dgm:prSet presAssocID="{48328429-D21F-4CF6-9089-EE3F5F57F2AC}" presName="Parent" presStyleLbl="alignNode1" presStyleIdx="0" presStyleCnt="4" custScaleX="106844" custScaleY="143707" custLinFactNeighborX="-88" custLinFactNeighborY="-3514">
         <dgm:presLayoutVars>
           <dgm:bulletEnabled val="1"/>
         </dgm:presLayoutVars>
@@ -1058,11 +1117,11 @@
       <dgm:spPr/>
     </dgm:pt>
     <dgm:pt modelId="{12504387-322C-4A1F-83F9-6EE1CF573975}" type="pres">
-      <dgm:prSet presAssocID="{300FCD3E-1ADF-4D8E-8B7F-C23D248E5AA3}" presName="Accent" presStyleLbl="alignAcc1" presStyleIdx="1" presStyleCnt="3"/>
+      <dgm:prSet presAssocID="{300FCD3E-1ADF-4D8E-8B7F-C23D248E5AA3}" presName="Accent" presStyleLbl="alignAcc1" presStyleIdx="1" presStyleCnt="4"/>
       <dgm:spPr/>
     </dgm:pt>
     <dgm:pt modelId="{D022753B-A66D-4602-ABB6-796040F5CE18}" type="pres">
-      <dgm:prSet presAssocID="{300FCD3E-1ADF-4D8E-8B7F-C23D248E5AA3}" presName="Image" presStyleLbl="node1" presStyleIdx="1" presStyleCnt="3"/>
+      <dgm:prSet presAssocID="{300FCD3E-1ADF-4D8E-8B7F-C23D248E5AA3}" presName="Image" presStyleLbl="node1" presStyleIdx="1" presStyleCnt="4" custLinFactNeighborX="-1105" custLinFactNeighborY="32282"/>
       <dgm:spPr>
         <a:blipFill>
           <a:blip xmlns:r="http://schemas.openxmlformats.org/officeDocument/2006/relationships" r:embed="rId2" cstate="print">
@@ -1080,7 +1139,7 @@
       </dgm:spPr>
     </dgm:pt>
     <dgm:pt modelId="{127011FC-75CC-4F83-88D1-BE430CFF9A84}" type="pres">
-      <dgm:prSet presAssocID="{300FCD3E-1ADF-4D8E-8B7F-C23D248E5AA3}" presName="Child" presStyleLbl="revTx" presStyleIdx="1" presStyleCnt="3">
+      <dgm:prSet presAssocID="{300FCD3E-1ADF-4D8E-8B7F-C23D248E5AA3}" presName="Child" presStyleLbl="revTx" presStyleIdx="1" presStyleCnt="4">
         <dgm:presLayoutVars>
           <dgm:bulletEnabled val="1"/>
         </dgm:presLayoutVars>
@@ -1088,7 +1147,7 @@
       <dgm:spPr/>
     </dgm:pt>
     <dgm:pt modelId="{8D939DD1-E3FC-476D-A7B7-BE9BFAD49D59}" type="pres">
-      <dgm:prSet presAssocID="{300FCD3E-1ADF-4D8E-8B7F-C23D248E5AA3}" presName="Parent" presStyleLbl="alignNode1" presStyleIdx="1" presStyleCnt="3">
+      <dgm:prSet presAssocID="{300FCD3E-1ADF-4D8E-8B7F-C23D248E5AA3}" presName="Parent" presStyleLbl="alignNode1" presStyleIdx="1" presStyleCnt="4" custScaleY="190934" custLinFactNeighborX="-1376" custLinFactNeighborY="-2334">
         <dgm:presLayoutVars>
           <dgm:bulletEnabled val="1"/>
         </dgm:presLayoutVars>
@@ -1104,11 +1163,11 @@
       <dgm:spPr/>
     </dgm:pt>
     <dgm:pt modelId="{43044997-AB41-4968-8926-64242410CEAD}" type="pres">
-      <dgm:prSet presAssocID="{E809D839-0B00-496A-8F4D-A5873DC8214F}" presName="Accent" presStyleLbl="alignAcc1" presStyleIdx="2" presStyleCnt="3"/>
+      <dgm:prSet presAssocID="{E809D839-0B00-496A-8F4D-A5873DC8214F}" presName="Accent" presStyleLbl="alignAcc1" presStyleIdx="2" presStyleCnt="4"/>
       <dgm:spPr/>
     </dgm:pt>
     <dgm:pt modelId="{D5169B72-0247-454D-8FB6-CA47B8B062D4}" type="pres">
-      <dgm:prSet presAssocID="{E809D839-0B00-496A-8F4D-A5873DC8214F}" presName="Image" presStyleLbl="node1" presStyleIdx="2" presStyleCnt="3"/>
+      <dgm:prSet presAssocID="{E809D839-0B00-496A-8F4D-A5873DC8214F}" presName="Image" presStyleLbl="node1" presStyleIdx="2" presStyleCnt="4" custLinFactNeighborX="3545" custLinFactNeighborY="31420"/>
       <dgm:spPr>
         <a:blipFill>
           <a:blip xmlns:r="http://schemas.openxmlformats.org/officeDocument/2006/relationships" r:embed="rId3" cstate="print">
@@ -1126,7 +1185,7 @@
       </dgm:spPr>
     </dgm:pt>
     <dgm:pt modelId="{F093D090-122F-4906-ABAA-3C71DE37E2B3}" type="pres">
-      <dgm:prSet presAssocID="{E809D839-0B00-496A-8F4D-A5873DC8214F}" presName="Child" presStyleLbl="revTx" presStyleIdx="2" presStyleCnt="3">
+      <dgm:prSet presAssocID="{E809D839-0B00-496A-8F4D-A5873DC8214F}" presName="Child" presStyleLbl="revTx" presStyleIdx="2" presStyleCnt="4">
         <dgm:presLayoutVars>
           <dgm:bulletEnabled val="1"/>
         </dgm:presLayoutVars>
@@ -1134,7 +1193,53 @@
       <dgm:spPr/>
     </dgm:pt>
     <dgm:pt modelId="{86FAEBA4-3DF6-4395-AAED-3508B0466690}" type="pres">
-      <dgm:prSet presAssocID="{E809D839-0B00-496A-8F4D-A5873DC8214F}" presName="Parent" presStyleLbl="alignNode1" presStyleIdx="2" presStyleCnt="3">
+      <dgm:prSet presAssocID="{E809D839-0B00-496A-8F4D-A5873DC8214F}" presName="Parent" presStyleLbl="alignNode1" presStyleIdx="2" presStyleCnt="4" custScaleX="106928" custScaleY="177012" custLinFactNeighborX="-492" custLinFactNeighborY="-14522">
+        <dgm:presLayoutVars>
+          <dgm:bulletEnabled val="1"/>
+        </dgm:presLayoutVars>
+      </dgm:prSet>
+      <dgm:spPr/>
+    </dgm:pt>
+    <dgm:pt modelId="{BDCF2D4A-2ADA-4A76-824C-34EA7330DCAE}" type="pres">
+      <dgm:prSet presAssocID="{7A1240A1-FB87-4BEE-962A-CA8BF0B67626}" presName="sibTrans" presStyleCnt="0"/>
+      <dgm:spPr/>
+    </dgm:pt>
+    <dgm:pt modelId="{2363DEF2-8231-45DF-B274-5F73A5B28355}" type="pres">
+      <dgm:prSet presAssocID="{E2CF72DC-2E2B-4ED5-BFB7-331C3962E7F7}" presName="composite" presStyleCnt="0"/>
+      <dgm:spPr/>
+    </dgm:pt>
+    <dgm:pt modelId="{C960E0DB-606E-4D74-A953-CAB9CDAF8962}" type="pres">
+      <dgm:prSet presAssocID="{E2CF72DC-2E2B-4ED5-BFB7-331C3962E7F7}" presName="Accent" presStyleLbl="alignAcc1" presStyleIdx="3" presStyleCnt="4"/>
+      <dgm:spPr/>
+    </dgm:pt>
+    <dgm:pt modelId="{1E1A77DB-1B36-4B2C-94D1-29D93F5BCC36}" type="pres">
+      <dgm:prSet presAssocID="{E2CF72DC-2E2B-4ED5-BFB7-331C3962E7F7}" presName="Image" presStyleLbl="node1" presStyleIdx="3" presStyleCnt="4" custLinFactNeighborX="-3314" custLinFactNeighborY="30278"/>
+      <dgm:spPr>
+        <a:blipFill>
+          <a:blip xmlns:r="http://schemas.openxmlformats.org/officeDocument/2006/relationships" r:embed="rId4" cstate="print">
+            <a:extLst>
+              <a:ext uri="{28A0092B-C50C-407E-A947-70E740481C1C}">
+                <a14:useLocalDpi xmlns:a14="http://schemas.microsoft.com/office/drawing/2010/main" val="0"/>
+              </a:ext>
+            </a:extLst>
+          </a:blip>
+          <a:srcRect/>
+          <a:stretch>
+            <a:fillRect t="-8000" b="-8000"/>
+          </a:stretch>
+        </a:blipFill>
+      </dgm:spPr>
+    </dgm:pt>
+    <dgm:pt modelId="{85C81F43-D82B-4F2C-BB52-E21B6943BC59}" type="pres">
+      <dgm:prSet presAssocID="{E2CF72DC-2E2B-4ED5-BFB7-331C3962E7F7}" presName="Child" presStyleLbl="revTx" presStyleIdx="3" presStyleCnt="4" custLinFactNeighborX="-653" custLinFactNeighborY="-50227">
+        <dgm:presLayoutVars>
+          <dgm:bulletEnabled val="1"/>
+        </dgm:presLayoutVars>
+      </dgm:prSet>
+      <dgm:spPr/>
+    </dgm:pt>
+    <dgm:pt modelId="{11ECF1A5-143E-4DA1-B2CA-126495773D84}" type="pres">
+      <dgm:prSet presAssocID="{E2CF72DC-2E2B-4ED5-BFB7-331C3962E7F7}" presName="Parent" presStyleLbl="alignNode1" presStyleIdx="3" presStyleCnt="4" custScaleY="207162">
         <dgm:presLayoutVars>
           <dgm:bulletEnabled val="1"/>
         </dgm:presLayoutVars>
@@ -1146,10 +1251,12 @@
     <dgm:cxn modelId="{B69EAD09-CE7B-422B-AB28-DF2AB0315780}" type="presOf" srcId="{300FCD3E-1ADF-4D8E-8B7F-C23D248E5AA3}" destId="{8D939DD1-E3FC-476D-A7B7-BE9BFAD49D59}" srcOrd="0" destOrd="0" presId="urn:microsoft.com/office/officeart/2008/layout/TitlePictureLineup"/>
     <dgm:cxn modelId="{A1EEBA2F-1E6B-4887-9B56-C6E111B8AC0A}" type="presOf" srcId="{48328429-D21F-4CF6-9089-EE3F5F57F2AC}" destId="{694EF9CD-9C4C-4DF2-B46C-70C927713002}" srcOrd="0" destOrd="0" presId="urn:microsoft.com/office/officeart/2008/layout/TitlePictureLineup"/>
     <dgm:cxn modelId="{6A0A065E-D593-4F6E-BB02-BF63EE5BC407}" type="presOf" srcId="{25AFBC85-EE41-46FB-A7F4-99ED4084C835}" destId="{8C6E4A05-D928-421F-BB35-AB0FFEB0B7C4}" srcOrd="0" destOrd="0" presId="urn:microsoft.com/office/officeart/2008/layout/TitlePictureLineup"/>
+    <dgm:cxn modelId="{BCB0B493-A2FB-4EE2-9DAE-B24E642E4933}" srcId="{25AFBC85-EE41-46FB-A7F4-99ED4084C835}" destId="{E2CF72DC-2E2B-4ED5-BFB7-331C3962E7F7}" srcOrd="3" destOrd="0" parTransId="{D2346941-9D9D-4E3D-8F0D-4F0C73C8D592}" sibTransId="{EEBE1EC0-3064-4A16-B333-AF8EE243844B}"/>
     <dgm:cxn modelId="{E79E63B0-1784-4833-BB34-64553DB577AF}" type="presOf" srcId="{E809D839-0B00-496A-8F4D-A5873DC8214F}" destId="{86FAEBA4-3DF6-4395-AAED-3508B0466690}" srcOrd="0" destOrd="0" presId="urn:microsoft.com/office/officeart/2008/layout/TitlePictureLineup"/>
     <dgm:cxn modelId="{B7AA9BCE-D649-4F1B-B108-93466D2481F6}" srcId="{25AFBC85-EE41-46FB-A7F4-99ED4084C835}" destId="{48328429-D21F-4CF6-9089-EE3F5F57F2AC}" srcOrd="0" destOrd="0" parTransId="{1635AB15-42A4-42D6-9F2B-33788AD7A83B}" sibTransId="{C822654F-BF62-47E3-96FD-AE4B604B788B}"/>
     <dgm:cxn modelId="{2E482BDA-3DBD-4618-9ADE-9998B29E84B4}" srcId="{25AFBC85-EE41-46FB-A7F4-99ED4084C835}" destId="{E809D839-0B00-496A-8F4D-A5873DC8214F}" srcOrd="2" destOrd="0" parTransId="{33052904-D5A7-4405-ADB3-8034FC3B073C}" sibTransId="{7A1240A1-FB87-4BEE-962A-CA8BF0B67626}"/>
     <dgm:cxn modelId="{4B471AE2-396E-4C5C-9110-4123DA6DCE53}" srcId="{25AFBC85-EE41-46FB-A7F4-99ED4084C835}" destId="{300FCD3E-1ADF-4D8E-8B7F-C23D248E5AA3}" srcOrd="1" destOrd="0" parTransId="{BC272908-DB90-4FCA-8784-0CA7E6A97E8F}" sibTransId="{4A78B380-1F85-4365-BF1F-0BD8AD7C8590}"/>
+    <dgm:cxn modelId="{09901AF0-77A9-4365-88D1-ABF48FFBBA1A}" type="presOf" srcId="{E2CF72DC-2E2B-4ED5-BFB7-331C3962E7F7}" destId="{11ECF1A5-143E-4DA1-B2CA-126495773D84}" srcOrd="0" destOrd="0" presId="urn:microsoft.com/office/officeart/2008/layout/TitlePictureLineup"/>
     <dgm:cxn modelId="{2883B54D-6D0D-4984-8328-B8F2F0C870F0}" type="presParOf" srcId="{8C6E4A05-D928-421F-BB35-AB0FFEB0B7C4}" destId="{C70F57D3-8238-4570-9FC4-5D7843655913}" srcOrd="0" destOrd="0" presId="urn:microsoft.com/office/officeart/2008/layout/TitlePictureLineup"/>
     <dgm:cxn modelId="{DF3A34C4-F710-489A-B5DC-740132FD18C3}" type="presParOf" srcId="{C70F57D3-8238-4570-9FC4-5D7843655913}" destId="{BCE78E20-DCE3-4C58-A181-B7224658428D}" srcOrd="0" destOrd="0" presId="urn:microsoft.com/office/officeart/2008/layout/TitlePictureLineup"/>
     <dgm:cxn modelId="{37D7ABF8-5C6E-49EB-9FA4-648505FC47F4}" type="presParOf" srcId="{C70F57D3-8238-4570-9FC4-5D7843655913}" destId="{01E68816-0985-4198-A5D3-44721F93E88F}" srcOrd="1" destOrd="0" presId="urn:microsoft.com/office/officeart/2008/layout/TitlePictureLineup"/>
@@ -1167,6 +1274,12 @@
     <dgm:cxn modelId="{0496A8EA-E562-4B1A-8C4B-029FA861D30F}" type="presParOf" srcId="{FE41D44C-D891-4409-A531-ABF0E800EC34}" destId="{D5169B72-0247-454D-8FB6-CA47B8B062D4}" srcOrd="1" destOrd="0" presId="urn:microsoft.com/office/officeart/2008/layout/TitlePictureLineup"/>
     <dgm:cxn modelId="{02D522EF-0D60-4EF3-9B04-DEBFDE487045}" type="presParOf" srcId="{FE41D44C-D891-4409-A531-ABF0E800EC34}" destId="{F093D090-122F-4906-ABAA-3C71DE37E2B3}" srcOrd="2" destOrd="0" presId="urn:microsoft.com/office/officeart/2008/layout/TitlePictureLineup"/>
     <dgm:cxn modelId="{FFBF745F-77DD-46F0-8606-30AB3C1F223C}" type="presParOf" srcId="{FE41D44C-D891-4409-A531-ABF0E800EC34}" destId="{86FAEBA4-3DF6-4395-AAED-3508B0466690}" srcOrd="3" destOrd="0" presId="urn:microsoft.com/office/officeart/2008/layout/TitlePictureLineup"/>
+    <dgm:cxn modelId="{111F5BF9-53E9-4E21-B399-E081C8D435DA}" type="presParOf" srcId="{8C6E4A05-D928-421F-BB35-AB0FFEB0B7C4}" destId="{BDCF2D4A-2ADA-4A76-824C-34EA7330DCAE}" srcOrd="5" destOrd="0" presId="urn:microsoft.com/office/officeart/2008/layout/TitlePictureLineup"/>
+    <dgm:cxn modelId="{9B3C2357-0852-4358-A672-959D36771E95}" type="presParOf" srcId="{8C6E4A05-D928-421F-BB35-AB0FFEB0B7C4}" destId="{2363DEF2-8231-45DF-B274-5F73A5B28355}" srcOrd="6" destOrd="0" presId="urn:microsoft.com/office/officeart/2008/layout/TitlePictureLineup"/>
+    <dgm:cxn modelId="{12065D49-D49F-40AD-93F1-5C4CFA8C6076}" type="presParOf" srcId="{2363DEF2-8231-45DF-B274-5F73A5B28355}" destId="{C960E0DB-606E-4D74-A953-CAB9CDAF8962}" srcOrd="0" destOrd="0" presId="urn:microsoft.com/office/officeart/2008/layout/TitlePictureLineup"/>
+    <dgm:cxn modelId="{C792F573-818C-4EB0-914B-0C2524CC2A0F}" type="presParOf" srcId="{2363DEF2-8231-45DF-B274-5F73A5B28355}" destId="{1E1A77DB-1B36-4B2C-94D1-29D93F5BCC36}" srcOrd="1" destOrd="0" presId="urn:microsoft.com/office/officeart/2008/layout/TitlePictureLineup"/>
+    <dgm:cxn modelId="{4B5E819E-F16E-4D93-85F6-70449B8FB0CB}" type="presParOf" srcId="{2363DEF2-8231-45DF-B274-5F73A5B28355}" destId="{85C81F43-D82B-4F2C-BB52-E21B6943BC59}" srcOrd="2" destOrd="0" presId="urn:microsoft.com/office/officeart/2008/layout/TitlePictureLineup"/>
+    <dgm:cxn modelId="{970FEAE7-050D-4D89-B91E-E5F13F5F12F6}" type="presParOf" srcId="{2363DEF2-8231-45DF-B274-5F73A5B28355}" destId="{11ECF1A5-143E-4DA1-B2CA-126495773D84}" srcOrd="3" destOrd="0" presId="urn:microsoft.com/office/officeart/2008/layout/TitlePictureLineup"/>
   </dgm:cxnLst>
   <dgm:bg/>
   <dgm:whole/>
@@ -1193,8 +1306,8 @@
       </dsp:nvSpPr>
       <dsp:spPr>
         <a:xfrm>
-          <a:off x="1190884" y="702226"/>
-          <a:ext cx="0" cy="6320035"/>
+          <a:off x="104887" y="828282"/>
+          <a:ext cx="0" cy="5378949"/>
         </a:xfrm>
         <a:prstGeom prst="line">
           <a:avLst/>
@@ -1242,8 +1355,8 @@
       </dsp:nvSpPr>
       <dsp:spPr>
         <a:xfrm>
-          <a:off x="1366441" y="922108"/>
-          <a:ext cx="3323987" cy="2825586"/>
+          <a:off x="186292" y="1925420"/>
+          <a:ext cx="2829028" cy="2404842"/>
         </a:xfrm>
         <a:prstGeom prst="rect">
           <a:avLst/>
@@ -1297,8 +1410,8 @@
       </dsp:nvSpPr>
       <dsp:spPr>
         <a:xfrm>
-          <a:off x="1366441" y="3756910"/>
-          <a:ext cx="3323987" cy="3265351"/>
+          <a:off x="254302" y="3428108"/>
+          <a:ext cx="2829028" cy="2779123"/>
         </a:xfrm>
         <a:prstGeom prst="rect">
           <a:avLst/>
@@ -1329,8 +1442,8 @@
       </dsp:nvSpPr>
       <dsp:spPr>
         <a:xfrm>
-          <a:off x="1190884" y="0"/>
-          <a:ext cx="3511131" cy="702226"/>
+          <a:off x="0" y="79010"/>
+          <a:ext cx="3192824" cy="858880"/>
         </a:xfrm>
         <a:prstGeom prst="rect">
           <a:avLst/>
@@ -1372,12 +1485,12 @@
         </a:fontRef>
       </dsp:style>
       <dsp:txBody>
-        <a:bodyPr spcFirstLastPara="0" vert="horz" wrap="square" lIns="91440" tIns="91440" rIns="91440" bIns="91440" numCol="1" spcCol="1270" anchor="ctr" anchorCtr="0">
+        <a:bodyPr spcFirstLastPara="0" vert="horz" wrap="square" lIns="60960" tIns="60960" rIns="60960" bIns="60960" numCol="1" spcCol="1270" anchor="ctr" anchorCtr="0">
           <a:noAutofit/>
         </a:bodyPr>
         <a:lstStyle/>
         <a:p>
-          <a:pPr marL="0" lvl="0" indent="0" algn="ctr" defTabSz="1600200">
+          <a:pPr marL="0" lvl="0" indent="0" algn="ctr" defTabSz="1066800">
             <a:lnSpc>
               <a:spcPct val="90000"/>
             </a:lnSpc>
@@ -1390,14 +1503,21 @@
             <a:buNone/>
           </a:pPr>
           <a:r>
-            <a:rPr lang="en-US" sz="3600" kern="1200" dirty="0"/>
-            <a:t>Phase I</a:t>
+            <a:rPr lang="en-GB" sz="2400" kern="1200" dirty="0">
+              <a:latin typeface="Dubai Light" panose="020B0303030403030204" pitchFamily="34" charset="-78"/>
+              <a:cs typeface="Dubai Light" panose="020B0303030403030204" pitchFamily="34" charset="-78"/>
+            </a:rPr>
+            <a:t>Insertion of Parameters</a:t>
           </a:r>
+          <a:endParaRPr lang="en-US" sz="2400" kern="1200" dirty="0">
+            <a:latin typeface="Dubai Light" panose="020B0303030403030204" pitchFamily="34" charset="-78"/>
+            <a:cs typeface="Dubai Light" panose="020B0303030403030204" pitchFamily="34" charset="-78"/>
+          </a:endParaRPr>
         </a:p>
       </dsp:txBody>
       <dsp:txXfrm>
-        <a:off x="1190884" y="0"/>
-        <a:ext cx="3511131" cy="702226"/>
+        <a:off x="0" y="79010"/>
+        <a:ext cx="3192824" cy="858880"/>
       </dsp:txXfrm>
     </dsp:sp>
     <dsp:sp modelId="{12504387-322C-4A1F-83F9-6EE1CF573975}">
@@ -1407,8 +1527,8 @@
       </dsp:nvSpPr>
       <dsp:spPr>
         <a:xfrm>
-          <a:off x="5419525" y="702226"/>
-          <a:ext cx="0" cy="6320035"/>
+          <a:off x="3855504" y="969411"/>
+          <a:ext cx="0" cy="5378949"/>
         </a:xfrm>
         <a:prstGeom prst="line">
           <a:avLst/>
@@ -1456,8 +1576,8 @@
       </dsp:nvSpPr>
       <dsp:spPr>
         <a:xfrm>
-          <a:off x="5595081" y="912894"/>
-          <a:ext cx="3323987" cy="2844016"/>
+          <a:off x="3973658" y="1930104"/>
+          <a:ext cx="2829028" cy="2420527"/>
         </a:xfrm>
         <a:prstGeom prst="rect">
           <a:avLst/>
@@ -1511,8 +1631,8 @@
       </dsp:nvSpPr>
       <dsp:spPr>
         <a:xfrm>
-          <a:off x="5595081" y="3756910"/>
-          <a:ext cx="3323987" cy="3265351"/>
+          <a:off x="4004919" y="3569237"/>
+          <a:ext cx="2829028" cy="2779123"/>
         </a:xfrm>
         <a:prstGeom prst="rect">
           <a:avLst/>
@@ -1543,8 +1663,8 @@
       </dsp:nvSpPr>
       <dsp:spPr>
         <a:xfrm>
-          <a:off x="5419525" y="0"/>
-          <a:ext cx="3511131" cy="702226"/>
+          <a:off x="3814385" y="86062"/>
+          <a:ext cx="2988305" cy="1141138"/>
         </a:xfrm>
         <a:prstGeom prst="rect">
           <a:avLst/>
@@ -1586,12 +1706,12 @@
         </a:fontRef>
       </dsp:style>
       <dsp:txBody>
-        <a:bodyPr spcFirstLastPara="0" vert="horz" wrap="square" lIns="91440" tIns="91440" rIns="91440" bIns="91440" numCol="1" spcCol="1270" anchor="ctr" anchorCtr="0">
+        <a:bodyPr spcFirstLastPara="0" vert="horz" wrap="square" lIns="60960" tIns="60960" rIns="60960" bIns="60960" numCol="1" spcCol="1270" anchor="ctr" anchorCtr="0">
           <a:noAutofit/>
         </a:bodyPr>
         <a:lstStyle/>
         <a:p>
-          <a:pPr marL="0" lvl="0" indent="0" algn="ctr" defTabSz="1600200">
+          <a:pPr marL="0" lvl="0" indent="0" algn="ctr" defTabSz="1066800">
             <a:lnSpc>
               <a:spcPct val="90000"/>
             </a:lnSpc>
@@ -1604,14 +1724,17 @@
             <a:buNone/>
           </a:pPr>
           <a:r>
-            <a:rPr lang="en-US" sz="3600" kern="1200" dirty="0"/>
-            <a:t>Phase II</a:t>
+            <a:rPr lang="en-US" sz="2400" kern="1200" dirty="0">
+              <a:latin typeface="Dubai Light" panose="020B0303030403030204" pitchFamily="34" charset="-78"/>
+              <a:cs typeface="Dubai Light" panose="020B0303030403030204" pitchFamily="34" charset="-78"/>
+            </a:rPr>
+            <a:t>Initiate Web Scraping</a:t>
           </a:r>
         </a:p>
       </dsp:txBody>
       <dsp:txXfrm>
-        <a:off x="5419525" y="0"/>
-        <a:ext cx="3511131" cy="702226"/>
+        <a:off x="3814385" y="86062"/>
+        <a:ext cx="2988305" cy="1141138"/>
       </dsp:txXfrm>
     </dsp:sp>
     <dsp:sp modelId="{43044997-AB41-4968-8926-64242410CEAD}">
@@ -1621,8 +1744,8 @@
       </dsp:nvSpPr>
       <dsp:spPr>
         <a:xfrm>
-          <a:off x="9648165" y="702226"/>
-          <a:ext cx="0" cy="6320035"/>
+          <a:off x="7607376" y="927808"/>
+          <a:ext cx="0" cy="5378949"/>
         </a:xfrm>
         <a:prstGeom prst="line">
           <a:avLst/>
@@ -1670,8 +1793,8 @@
       </dsp:nvSpPr>
       <dsp:spPr>
         <a:xfrm>
-          <a:off x="9823721" y="912894"/>
-          <a:ext cx="3323987" cy="2844016"/>
+          <a:off x="7857080" y="1867636"/>
+          <a:ext cx="2829028" cy="2420527"/>
         </a:xfrm>
         <a:prstGeom prst="rect">
           <a:avLst/>
@@ -1725,8 +1848,8 @@
       </dsp:nvSpPr>
       <dsp:spPr>
         <a:xfrm>
-          <a:off x="9823721" y="3756910"/>
-          <a:ext cx="3323987" cy="3265351"/>
+          <a:off x="7756791" y="3527633"/>
+          <a:ext cx="2829028" cy="2779123"/>
         </a:xfrm>
         <a:prstGeom prst="rect">
           <a:avLst/>
@@ -1757,8 +1880,8 @@
       </dsp:nvSpPr>
       <dsp:spPr>
         <a:xfrm>
-          <a:off x="9648165" y="0"/>
-          <a:ext cx="3511131" cy="702226"/>
+          <a:off x="7489159" y="13219"/>
+          <a:ext cx="3195334" cy="1057931"/>
         </a:xfrm>
         <a:prstGeom prst="rect">
           <a:avLst/>
@@ -1800,12 +1923,12 @@
         </a:fontRef>
       </dsp:style>
       <dsp:txBody>
-        <a:bodyPr spcFirstLastPara="0" vert="horz" wrap="square" lIns="91440" tIns="91440" rIns="91440" bIns="91440" numCol="1" spcCol="1270" anchor="ctr" anchorCtr="0">
+        <a:bodyPr spcFirstLastPara="0" vert="horz" wrap="square" lIns="58420" tIns="58420" rIns="58420" bIns="58420" numCol="1" spcCol="1270" anchor="ctr" anchorCtr="0">
           <a:noAutofit/>
         </a:bodyPr>
         <a:lstStyle/>
         <a:p>
-          <a:pPr marL="0" lvl="0" indent="0" algn="ctr" defTabSz="1600200">
+          <a:pPr marL="0" lvl="0" indent="0" algn="ctr" defTabSz="1022350">
             <a:lnSpc>
               <a:spcPct val="90000"/>
             </a:lnSpc>
@@ -1818,15 +1941,242 @@
             <a:buNone/>
           </a:pPr>
           <a:r>
-            <a:rPr lang="en-GB" sz="3600" kern="1200" dirty="0"/>
-            <a:t>Phase III</a:t>
+            <a:rPr lang="en-GB" sz="2300" kern="1200" dirty="0">
+              <a:latin typeface="Dubai Light" panose="020B0303030403030204" pitchFamily="34" charset="-78"/>
+              <a:cs typeface="Dubai Light" panose="020B0303030403030204" pitchFamily="34" charset="-78"/>
+            </a:rPr>
+            <a:t>Keying of Data and Tagging Analysis</a:t>
           </a:r>
-          <a:endParaRPr lang="en-US" sz="3600" kern="1200" dirty="0"/>
+          <a:endParaRPr lang="en-US" sz="2300" kern="1200" dirty="0">
+            <a:latin typeface="Dubai Light" panose="020B0303030403030204" pitchFamily="34" charset="-78"/>
+            <a:cs typeface="Dubai Light" panose="020B0303030403030204" pitchFamily="34" charset="-78"/>
+          </a:endParaRPr>
         </a:p>
       </dsp:txBody>
       <dsp:txXfrm>
-        <a:off x="9648165" y="0"/>
-        <a:ext cx="3511131" cy="702226"/>
+        <a:off x="7489159" y="13219"/>
+        <a:ext cx="3195334" cy="1057931"/>
+      </dsp:txXfrm>
+    </dsp:sp>
+    <dsp:sp modelId="{C960E0DB-606E-4D74-A953-CAB9CDAF8962}">
+      <dsp:nvSpPr>
+        <dsp:cNvPr id="0" name=""/>
+        <dsp:cNvSpPr/>
+      </dsp:nvSpPr>
+      <dsp:spPr>
+        <a:xfrm>
+          <a:off x="11359248" y="1017905"/>
+          <a:ext cx="0" cy="5378949"/>
+        </a:xfrm>
+        <a:prstGeom prst="line">
+          <a:avLst/>
+        </a:prstGeom>
+        <a:solidFill>
+          <a:schemeClr val="lt1">
+            <a:alpha val="90000"/>
+            <a:hueOff val="0"/>
+            <a:satOff val="0"/>
+            <a:lumOff val="0"/>
+            <a:alphaOff val="0"/>
+          </a:schemeClr>
+        </a:solidFill>
+        <a:ln w="12700" cap="flat" cmpd="sng" algn="ctr">
+          <a:solidFill>
+            <a:schemeClr val="accent1">
+              <a:hueOff val="0"/>
+              <a:satOff val="0"/>
+              <a:lumOff val="0"/>
+              <a:alphaOff val="0"/>
+            </a:schemeClr>
+          </a:solidFill>
+          <a:prstDash val="solid"/>
+          <a:miter lim="800000"/>
+        </a:ln>
+        <a:effectLst/>
+      </dsp:spPr>
+      <dsp:style>
+        <a:lnRef idx="2">
+          <a:scrgbClr r="0" g="0" b="0"/>
+        </a:lnRef>
+        <a:fillRef idx="1">
+          <a:scrgbClr r="0" g="0" b="0"/>
+        </a:fillRef>
+        <a:effectRef idx="0">
+          <a:scrgbClr r="0" g="0" b="0"/>
+        </a:effectRef>
+        <a:fontRef idx="minor"/>
+      </dsp:style>
+    </dsp:sp>
+    <dsp:sp modelId="{1E1A77DB-1B36-4B2C-94D1-29D93F5BCC36}">
+      <dsp:nvSpPr>
+        <dsp:cNvPr id="0" name=""/>
+        <dsp:cNvSpPr/>
+      </dsp:nvSpPr>
+      <dsp:spPr>
+        <a:xfrm>
+          <a:off x="11414909" y="1930091"/>
+          <a:ext cx="2829028" cy="2420527"/>
+        </a:xfrm>
+        <a:prstGeom prst="rect">
+          <a:avLst/>
+        </a:prstGeom>
+        <a:blipFill>
+          <a:blip xmlns:r="http://schemas.openxmlformats.org/officeDocument/2006/relationships" r:embed="rId4" cstate="print">
+            <a:extLst>
+              <a:ext uri="{28A0092B-C50C-407E-A947-70E740481C1C}">
+                <a14:useLocalDpi xmlns:a14="http://schemas.microsoft.com/office/drawing/2010/main" val="0"/>
+              </a:ext>
+            </a:extLst>
+          </a:blip>
+          <a:srcRect/>
+          <a:stretch>
+            <a:fillRect t="-8000" b="-8000"/>
+          </a:stretch>
+        </a:blipFill>
+        <a:ln w="12700" cap="flat" cmpd="sng" algn="ctr">
+          <a:solidFill>
+            <a:schemeClr val="lt1">
+              <a:hueOff val="0"/>
+              <a:satOff val="0"/>
+              <a:lumOff val="0"/>
+              <a:alphaOff val="0"/>
+            </a:schemeClr>
+          </a:solidFill>
+          <a:prstDash val="solid"/>
+          <a:miter lim="800000"/>
+        </a:ln>
+        <a:effectLst/>
+      </dsp:spPr>
+      <dsp:style>
+        <a:lnRef idx="2">
+          <a:scrgbClr r="0" g="0" b="0"/>
+        </a:lnRef>
+        <a:fillRef idx="1">
+          <a:scrgbClr r="0" g="0" b="0"/>
+        </a:fillRef>
+        <a:effectRef idx="0">
+          <a:scrgbClr r="0" g="0" b="0"/>
+        </a:effectRef>
+        <a:fontRef idx="minor">
+          <a:schemeClr val="lt1"/>
+        </a:fontRef>
+      </dsp:style>
+    </dsp:sp>
+    <dsp:sp modelId="{85C81F43-D82B-4F2C-BB52-E21B6943BC59}">
+      <dsp:nvSpPr>
+        <dsp:cNvPr id="0" name=""/>
+        <dsp:cNvSpPr/>
+      </dsp:nvSpPr>
+      <dsp:spPr>
+        <a:xfrm>
+          <a:off x="11490190" y="2221860"/>
+          <a:ext cx="2829028" cy="2779123"/>
+        </a:xfrm>
+        <a:prstGeom prst="rect">
+          <a:avLst/>
+        </a:prstGeom>
+        <a:noFill/>
+        <a:ln>
+          <a:noFill/>
+        </a:ln>
+        <a:effectLst/>
+      </dsp:spPr>
+      <dsp:style>
+        <a:lnRef idx="0">
+          <a:scrgbClr r="0" g="0" b="0"/>
+        </a:lnRef>
+        <a:fillRef idx="0">
+          <a:scrgbClr r="0" g="0" b="0"/>
+        </a:fillRef>
+        <a:effectRef idx="0">
+          <a:scrgbClr r="0" g="0" b="0"/>
+        </a:effectRef>
+        <a:fontRef idx="minor"/>
+      </dsp:style>
+    </dsp:sp>
+    <dsp:sp modelId="{11ECF1A5-143E-4DA1-B2CA-126495773D84}">
+      <dsp:nvSpPr>
+        <dsp:cNvPr id="0" name=""/>
+        <dsp:cNvSpPr/>
+      </dsp:nvSpPr>
+      <dsp:spPr>
+        <a:xfrm>
+          <a:off x="11359248" y="100012"/>
+          <a:ext cx="2988305" cy="1238126"/>
+        </a:xfrm>
+        <a:prstGeom prst="rect">
+          <a:avLst/>
+        </a:prstGeom>
+        <a:solidFill>
+          <a:schemeClr val="accent1">
+            <a:hueOff val="0"/>
+            <a:satOff val="0"/>
+            <a:lumOff val="0"/>
+            <a:alphaOff val="0"/>
+          </a:schemeClr>
+        </a:solidFill>
+        <a:ln w="12700" cap="flat" cmpd="sng" algn="ctr">
+          <a:solidFill>
+            <a:schemeClr val="accent1">
+              <a:hueOff val="0"/>
+              <a:satOff val="0"/>
+              <a:lumOff val="0"/>
+              <a:alphaOff val="0"/>
+            </a:schemeClr>
+          </a:solidFill>
+          <a:prstDash val="solid"/>
+          <a:miter lim="800000"/>
+        </a:ln>
+        <a:effectLst/>
+      </dsp:spPr>
+      <dsp:style>
+        <a:lnRef idx="2">
+          <a:scrgbClr r="0" g="0" b="0"/>
+        </a:lnRef>
+        <a:fillRef idx="1">
+          <a:scrgbClr r="0" g="0" b="0"/>
+        </a:fillRef>
+        <a:effectRef idx="0">
+          <a:scrgbClr r="0" g="0" b="0"/>
+        </a:effectRef>
+        <a:fontRef idx="minor">
+          <a:schemeClr val="lt1"/>
+        </a:fontRef>
+      </dsp:style>
+      <dsp:txBody>
+        <a:bodyPr spcFirstLastPara="0" vert="horz" wrap="square" lIns="60960" tIns="60960" rIns="60960" bIns="60960" numCol="1" spcCol="1270" anchor="ctr" anchorCtr="0">
+          <a:noAutofit/>
+        </a:bodyPr>
+        <a:lstStyle/>
+        <a:p>
+          <a:pPr marL="0" lvl="0" indent="0" algn="ctr" defTabSz="1066800">
+            <a:lnSpc>
+              <a:spcPct val="90000"/>
+            </a:lnSpc>
+            <a:spcBef>
+              <a:spcPct val="0"/>
+            </a:spcBef>
+            <a:spcAft>
+              <a:spcPct val="35000"/>
+            </a:spcAft>
+            <a:buNone/>
+          </a:pPr>
+          <a:r>
+            <a:rPr lang="en-GB" sz="2400" kern="1200" dirty="0">
+              <a:latin typeface="Dubai Light" panose="020B0303030403030204" pitchFamily="34" charset="-78"/>
+              <a:cs typeface="Dubai Light" panose="020B0303030403030204" pitchFamily="34" charset="-78"/>
+            </a:rPr>
+            <a:t>Calculation of Accuracy</a:t>
+          </a:r>
+          <a:endParaRPr lang="en-US" sz="2400" kern="1200" dirty="0">
+            <a:latin typeface="Dubai Light" panose="020B0303030403030204" pitchFamily="34" charset="-78"/>
+            <a:cs typeface="Dubai Light" panose="020B0303030403030204" pitchFamily="34" charset="-78"/>
+          </a:endParaRPr>
+        </a:p>
+      </dsp:txBody>
+      <dsp:txXfrm>
+        <a:off x="11359248" y="100012"/>
+        <a:ext cx="2988305" cy="1238126"/>
       </dsp:txXfrm>
     </dsp:sp>
   </dsp:spTree>
@@ -3239,7 +3589,7 @@
           <a:p>
             <a:fld id="{F1C0B079-A316-4C9B-B165-DF9EA8325D2C}" type="datetimeFigureOut">
               <a:rPr lang="en-US" smtClean="0"/>
-              <a:t>5/28/2019</a:t>
+              <a:t>6/5/2019</a:t>
             </a:fld>
             <a:endParaRPr lang="en-US"/>
           </a:p>
@@ -3404,7 +3754,7 @@
           <a:p>
             <a:fld id="{38F28AB8-57D1-494F-9851-055AD867E790}" type="datetimeFigureOut">
               <a:rPr lang="en-US" smtClean="0"/>
-              <a:t>5/28/2019</a:t>
+              <a:t>6/5/2019</a:t>
             </a:fld>
             <a:endParaRPr lang="en-US"/>
           </a:p>
@@ -6952,7 +7302,7 @@
           <a:p>
             <a:fld id="{ECAA57DF-1C19-4726-AB84-014692BAD8F5}" type="datetimeFigureOut">
               <a:rPr lang="en-US" smtClean="0"/>
-              <a:t>5/28/2019</a:t>
+              <a:t>6/5/2019</a:t>
             </a:fld>
             <a:endParaRPr lang="en-US"/>
           </a:p>
@@ -7073,7 +7423,7 @@
   <p:clrMapOvr>
     <a:masterClrMapping/>
   </p:clrMapOvr>
-  <p:extLst mod="1">
+  <p:extLst>
     <p:ext uri="{DCECCB84-F9BA-43D5-87BE-67443E8EF086}">
       <p15:sldGuideLst xmlns:p15="http://schemas.microsoft.com/office/powerpoint/2012/main">
         <p15:guide id="1" pos="9168" userDrawn="1">
@@ -7291,7 +7641,7 @@
             <a:fld id="{ECAA57DF-1C19-4726-AB84-014692BAD8F5}" type="datetimeFigureOut">
               <a:rPr lang="en-US" smtClean="0"/>
               <a:pPr/>
-              <a:t>5/28/2019</a:t>
+              <a:t>6/5/2019</a:t>
             </a:fld>
             <a:endParaRPr lang="en-US"/>
           </a:p>
@@ -7794,7 +8144,7 @@
       </a:lvl9pPr>
     </p:otherStyle>
   </p:txStyles>
-  <p:extLst mod="1">
+  <p:extLst>
     <p:ext uri="{27BBF7A9-308A-43DC-89C8-2F10F3537804}">
       <p15:sldGuideLst xmlns:p15="http://schemas.microsoft.com/office/powerpoint/2012/main">
         <p15:guide id="1" orient="horz" pos="10368" userDrawn="1">
@@ -7850,7 +8200,12 @@
             <p:ph type="title"/>
           </p:nvPr>
         </p:nvSpPr>
-        <p:spPr/>
+        <p:spPr>
+          <a:xfrm>
+            <a:off x="561892" y="685972"/>
+            <a:ext cx="30175200" cy="2971740"/>
+          </a:xfrm>
+        </p:spPr>
         <p:txBody>
           <a:bodyPr>
             <a:noAutofit/>
@@ -7858,8 +8213,8 @@
           <a:lstStyle/>
           <a:p>
             <a:r>
-              <a:rPr lang="en-GB" sz="8800" dirty="0"/>
-              <a:t>Using Blockchain to bolster pharmaceutical and medical device supply chain provenance and transparency.</a:t>
+              <a:rPr lang="en-US" dirty="0"/>
+              <a:t>Using Natural Language Processing to assure Data Quality in Web Scraping Operations.</a:t>
             </a:r>
             <a:endParaRPr lang="en-US" sz="8800" dirty="0"/>
           </a:p>
@@ -7887,7 +8242,15 @@
           <a:p>
             <a:r>
               <a:rPr lang="en-US" dirty="0"/>
-              <a:t>Matthew De Giorgio | K. Hautala-Hili | Institute of Information and Communication Technology | Institute of Business and Commerce </a:t>
+              <a:t>Matthew De Giorgio | Alan </a:t>
+            </a:r>
+            <a:r>
+              <a:rPr lang="en-US" dirty="0" err="1"/>
+              <a:t>Gatt</a:t>
+            </a:r>
+            <a:r>
+              <a:rPr lang="en-US" dirty="0"/>
+              <a:t> | Institute of Information and Communication Technology</a:t>
             </a:r>
           </a:p>
         </p:txBody>
@@ -7914,7 +8277,7 @@
           <a:p>
             <a:r>
               <a:rPr lang="en-US" dirty="0"/>
-              <a:t>Problem Statement </a:t>
+              <a:t>Abstract</a:t>
             </a:r>
           </a:p>
         </p:txBody>
@@ -7932,7 +8295,7 @@
         <p:spPr>
           <a:xfrm>
             <a:off x="1143000" y="7114032"/>
-            <a:ext cx="12801600" cy="3627418"/>
+            <a:ext cx="12801600" cy="3891308"/>
           </a:xfrm>
         </p:spPr>
         <p:txBody>
@@ -7941,12 +8304,16 @@
           <a:p>
             <a:pPr algn="just"/>
             <a:r>
-              <a:rPr lang="en-US" dirty="0">
+              <a:rPr lang="en-GB" dirty="0">
                 <a:latin typeface="Dubai Medium" panose="020B0603030403030204" pitchFamily="34" charset="-78"/>
                 <a:cs typeface="Dubai Medium" panose="020B0603030403030204" pitchFamily="34" charset="-78"/>
               </a:rPr>
-              <a:t>The purpose of this study is to explore the advances that blockchain brings to the pharmaceutical industry in terms of Drug authentication mainly focusing on the supply chain level.</a:t>
-            </a:r>
+              <a:t>The aim of this project was to test the accuracy of the end data after using  a web scraping and Natural Language Processing  based system with the intention of using the system as an alternative data source and aggregator for feeding a data model with a vast amount of usable data</a:t>
+            </a:r>
+            <a:endParaRPr lang="en-US" dirty="0">
+              <a:latin typeface="Dubai Medium" panose="020B0603030403030204" pitchFamily="34" charset="-78"/>
+              <a:cs typeface="Dubai Medium" panose="020B0603030403030204" pitchFamily="34" charset="-78"/>
+            </a:endParaRPr>
           </a:p>
         </p:txBody>
       </p:sp>
@@ -8007,9 +8374,9 @@
                 <a:latin typeface="Dubai Medium" panose="020B0603030403030204" pitchFamily="34" charset="-78"/>
                 <a:cs typeface="Dubai Medium" panose="020B0603030403030204" pitchFamily="34" charset="-78"/>
               </a:rPr>
-              <a:t>The Research project will take a qualitative approach that focuses on using interviews to gather perspectives from business leaders. This approach was taken to keep the research relevant to the end users of such technologies which in this case would be the businesses in the local pharmaceutical market.</a:t>
-            </a:r>
-            <a:endParaRPr lang="en-US" sz="3600" dirty="0">
+              <a:t>The study undertook a qualitative research style since the focus was to establish a proof of concept for a later project that would be on a larger scale. Using a Positivist-based Research Philosophy the will tagging mechanism within the NLTK python library was isolated and tested for accuracy.</a:t>
+            </a:r>
+            <a:endParaRPr lang="en-US" sz="4000" dirty="0">
               <a:latin typeface="Dubai Medium" panose="020B0603030403030204" pitchFamily="34" charset="-78"/>
               <a:cs typeface="Dubai Medium" panose="020B0603030403030204" pitchFamily="34" charset="-78"/>
             </a:endParaRPr>
@@ -8070,13 +8437,27 @@
               <a:buNone/>
             </a:pPr>
             <a:r>
-              <a:rPr lang="en-GB" sz="4000" dirty="0">
+              <a:rPr lang="en-GB" sz="3600" dirty="0">
                 <a:latin typeface="Dubai Medium" panose="020B0603030403030204" pitchFamily="34" charset="-78"/>
                 <a:cs typeface="Dubai Medium" panose="020B0603030403030204" pitchFamily="34" charset="-78"/>
               </a:rPr>
-              <a:t>Blockchain and distributed ledger technology-based projects are appearing in every industry due to the many possible advancements they could provide especially in audit trail applications. Enterprise software companies such as SAP are teaming up with world leading pharmaceutical companies to develop tracking systems that allow drug wholesalers to authenticate pharmaceuticals as they travel along the supply chain from manufacturing down to the end consumer/patient.</a:t>
-            </a:r>
-            <a:endParaRPr lang="en-US" sz="4000" dirty="0">
+              <a:t>This concept is being tackled by many institutions around the world including  DARPA (America’s Defence Advanced Research Project Agency) who create the DEFT (Deep Exploration and Filtering of Text) Program which utilises natural language processing (NLP), a form of artificial intelligence , to automatically extract relevant information and help analysts derive actionable insights from the data. Primarily based on two Python Libraries , </a:t>
+            </a:r>
+            <a:r>
+              <a:rPr lang="en-GB" sz="3600" dirty="0" err="1">
+                <a:latin typeface="Dubai Medium" panose="020B0603030403030204" pitchFamily="34" charset="-78"/>
+                <a:cs typeface="Dubai Medium" panose="020B0603030403030204" pitchFamily="34" charset="-78"/>
+              </a:rPr>
+              <a:t>BeautifulSoup</a:t>
+            </a:r>
+            <a:r>
+              <a:rPr lang="en-GB" sz="3600" dirty="0">
+                <a:latin typeface="Dubai Medium" panose="020B0603030403030204" pitchFamily="34" charset="-78"/>
+                <a:cs typeface="Dubai Medium" panose="020B0603030403030204" pitchFamily="34" charset="-78"/>
+              </a:rPr>
+              <a:t> and NLTK , the program sources the information from the designated websites , downloads it and processes it using Part-of-Sentence Tagging.</a:t>
+            </a:r>
+            <a:endParaRPr lang="en-US" sz="3600" dirty="0">
               <a:latin typeface="Dubai Medium" panose="020B0603030403030204" pitchFamily="34" charset="-78"/>
               <a:cs typeface="Dubai Medium" panose="020B0603030403030204" pitchFamily="34" charset="-78"/>
             </a:endParaRPr>
@@ -8120,14 +8501,14 @@
             <p:ph sz="quarter" idx="23"/>
             <p:extLst>
               <p:ext uri="{D42A27DB-BD31-4B8C-83A1-F6EECF244321}">
-                <p14:modId xmlns:p14="http://schemas.microsoft.com/office/powerpoint/2010/main" val="3774363636"/>
+                <p14:modId xmlns:p14="http://schemas.microsoft.com/office/powerpoint/2010/main" val="1633213140"/>
               </p:ext>
             </p:extLst>
           </p:nvPr>
         </p:nvGraphicFramePr>
         <p:xfrm>
-          <a:off x="14704141" y="7393925"/>
-          <a:ext cx="14350181" cy="7022262"/>
+          <a:off x="14704141" y="7393924"/>
+          <a:ext cx="14350181" cy="6496867"/>
         </p:xfrm>
         <a:graphic>
           <a:graphicData uri="http://schemas.openxmlformats.org/drawingml/2006/diagram">
@@ -8187,41 +8568,6 @@
           </a:p>
         </p:txBody>
       </p:sp>
-      <p:pic>
-        <p:nvPicPr>
-          <p:cNvPr id="75" name="Content Placeholder 74">
-            <a:extLst>
-              <a:ext uri="{FF2B5EF4-FFF2-40B4-BE49-F238E27FC236}">
-                <a16:creationId xmlns:a16="http://schemas.microsoft.com/office/drawing/2014/main" id="{C4FAD19D-CD59-4BF0-9B64-30D2A7CBD2BB}"/>
-              </a:ext>
-            </a:extLst>
-          </p:cNvPr>
-          <p:cNvPicPr>
-            <a:picLocks noGrp="1" noChangeAspect="1"/>
-          </p:cNvPicPr>
-          <p:nvPr>
-            <p:ph sz="quarter" idx="33"/>
-          </p:nvPr>
-        </p:nvPicPr>
-        <p:blipFill>
-          <a:blip r:embed="rId7">
-            <a:extLst>
-              <a:ext uri="{28A0092B-C50C-407E-A947-70E740481C1C}">
-                <a14:useLocalDpi xmlns:a14="http://schemas.microsoft.com/office/drawing/2010/main" val="0"/>
-              </a:ext>
-            </a:extLst>
-          </a:blip>
-          <a:stretch>
-            <a:fillRect/>
-          </a:stretch>
-        </p:blipFill>
-        <p:spPr>
-          <a:xfrm>
-            <a:off x="14704141" y="17525635"/>
-            <a:ext cx="14777645" cy="7998840"/>
-          </a:xfrm>
-        </p:spPr>
-      </p:pic>
       <p:sp>
         <p:nvSpPr>
           <p:cNvPr id="21" name="Text Placeholder 20"/>
@@ -8234,7 +8580,7 @@
         </p:nvSpPr>
         <p:spPr>
           <a:xfrm>
-            <a:off x="29900563" y="17938796"/>
+            <a:off x="29900563" y="21927393"/>
             <a:ext cx="12801600" cy="1219200"/>
           </a:xfrm>
         </p:spPr>
@@ -8261,116 +8607,90 @@
         </p:nvSpPr>
         <p:spPr>
           <a:xfrm>
-            <a:off x="29900563" y="19506882"/>
-            <a:ext cx="12801600" cy="6538769"/>
+            <a:off x="29900563" y="23547940"/>
+            <a:ext cx="12801600" cy="7343026"/>
           </a:xfrm>
         </p:spPr>
         <p:txBody>
           <a:bodyPr>
-            <a:normAutofit/>
+            <a:normAutofit fontScale="92500" lnSpcReduction="10000"/>
           </a:bodyPr>
           <a:lstStyle/>
           <a:p>
             <a:r>
-              <a:rPr lang="en-GB" sz="2000" dirty="0"/>
-              <a:t>Bhardwaj, G. (2018). </a:t>
-            </a:r>
-            <a:r>
-              <a:rPr lang="en-GB" sz="2000" i="1" dirty="0"/>
-              <a:t>Five use cases for blockchain in pharma - </a:t>
-            </a:r>
-            <a:r>
-              <a:rPr lang="en-GB" sz="2000" i="1" dirty="0" err="1"/>
-              <a:t>Pharmaphorum</a:t>
-            </a:r>
-            <a:r>
-              <a:rPr lang="en-GB" sz="2000" dirty="0"/>
-              <a:t>. [online] </a:t>
-            </a:r>
-            <a:r>
-              <a:rPr lang="en-GB" sz="2000" dirty="0" err="1"/>
-              <a:t>Pharmaphorum</a:t>
-            </a:r>
-            <a:r>
-              <a:rPr lang="en-GB" sz="2000" dirty="0"/>
-              <a:t>. Available at: https://pharmaphorum.com/views-and-analysis/five-use-cases-for-blockchain-in-pharma/ [Accessed 20 Jan. 2019].</a:t>
-            </a:r>
-            <a:endParaRPr lang="en-US" sz="2000" dirty="0"/>
-          </a:p>
-          <a:p>
-            <a:r>
-              <a:rPr lang="en-GB" sz="2000" dirty="0"/>
-              <a:t>Holland, R. (2017). </a:t>
-            </a:r>
-            <a:r>
-              <a:rPr lang="en-GB" sz="2000" i="1" dirty="0"/>
-              <a:t>83% of Life Science Leaders Believe Blockchain will be Adopted Within Five Years, Finds Survey from The Pistoia Alliance - Pistoia Alliance</a:t>
-            </a:r>
-            <a:r>
-              <a:rPr lang="en-GB" sz="2000" dirty="0"/>
-              <a:t>. [online] Pistoiaalliance.org. Available at: https://www.pistoiaalliance.org/83-life-science-leaders-believe-blockchain-will-adopted-within-five-years-finds-survey-pistoia-alliance/ [Accessed 18 Jan. 2019].</a:t>
-            </a:r>
-            <a:endParaRPr lang="en-US" sz="2000" dirty="0"/>
-          </a:p>
-          <a:p>
-            <a:r>
-              <a:rPr lang="en-GB" sz="2000" dirty="0"/>
-              <a:t>Kamel Boulos, M., Wilson, J. and Clauson, K. (2019). </a:t>
-            </a:r>
-            <a:r>
-              <a:rPr lang="en-GB" sz="2000" i="1" dirty="0"/>
-              <a:t>Geospatial blockchain: promises, challenges, and scenarios in health and healthcare</a:t>
-            </a:r>
-            <a:r>
-              <a:rPr lang="en-GB" sz="2000" dirty="0"/>
-              <a:t>. [online] International Journal of Health </a:t>
-            </a:r>
-            <a:r>
-              <a:rPr lang="en-GB" sz="2000" dirty="0" err="1"/>
-              <a:t>Geographics</a:t>
-            </a:r>
-            <a:r>
-              <a:rPr lang="en-GB" sz="2000" dirty="0"/>
-              <a:t>. Available at: https://ij-healthgeographics.biomedcentral.com/articles/10.1186/s12942-018-0144-x [Accessed 18 Jan. 2019].</a:t>
-            </a:r>
-            <a:endParaRPr lang="en-US" sz="2000" dirty="0"/>
-          </a:p>
-          <a:p>
-            <a:r>
-              <a:rPr lang="en-GB" sz="2000" dirty="0" err="1"/>
-              <a:t>Ledwith</a:t>
-            </a:r>
-            <a:r>
-              <a:rPr lang="en-GB" sz="2000" dirty="0"/>
-              <a:t>, S. (2018). </a:t>
-            </a:r>
-            <a:r>
-              <a:rPr lang="en-GB" sz="2000" i="1" dirty="0"/>
-              <a:t>Blockchain explained</a:t>
-            </a:r>
-            <a:r>
-              <a:rPr lang="en-GB" sz="2000" dirty="0"/>
-              <a:t>. [online] Reuters. Available at: https://graphics.reuters.com/TECHNOLOGY-BLOCKCHAIN/010070P11GN/index.html [Accessed 19 Jan. 2019].</a:t>
-            </a:r>
-            <a:endParaRPr lang="en-US" sz="2000" dirty="0"/>
-          </a:p>
-          <a:p>
-            <a:r>
-              <a:rPr lang="en-GB" sz="2000" dirty="0" err="1"/>
-              <a:t>Penski</a:t>
-            </a:r>
-            <a:r>
-              <a:rPr lang="en-GB" sz="2000" dirty="0"/>
-              <a:t>, L. (2019). </a:t>
-            </a:r>
-            <a:r>
-              <a:rPr lang="en-GB" sz="2000" i="1" dirty="0"/>
-              <a:t>Blockchain Co-Innovation in the Pharmaceutical Industry | SAP Blogs</a:t>
-            </a:r>
-            <a:r>
-              <a:rPr lang="en-GB" sz="2000" dirty="0"/>
-              <a:t>. [online] Blogs.sap.com. Available at: https://blogs.sap.com/2018/04/17/blockchain-co-innovaion-in-the-pharmaceutical-industry/ [Accessed 19 Jan. 2019]</a:t>
-            </a:r>
+              <a:rPr lang="en-US" dirty="0" err="1"/>
+              <a:t>Bringsjord</a:t>
+            </a:r>
+            <a:r>
+              <a:rPr lang="en-US" dirty="0"/>
+              <a:t>, Selmer, </a:t>
+            </a:r>
+            <a:r>
+              <a:rPr lang="en-US" dirty="0" err="1"/>
+              <a:t>Govindarajulu</a:t>
+            </a:r>
+            <a:r>
+              <a:rPr lang="en-US" dirty="0"/>
+              <a:t> and Sundar, N. (2018). </a:t>
+            </a:r>
+            <a:r>
+              <a:rPr lang="en-US" i="1" dirty="0"/>
+              <a:t>Artificial Intelligence (Stanford Encyclopedia of Philosophy)</a:t>
+            </a:r>
+            <a:r>
+              <a:rPr lang="en-US" dirty="0"/>
+              <a:t>. [online] Plato.stanford.edu. Available at: https://plato.stanford.edu/entries/artificial-intelligence/#HistAI [Accessed 1 Mar. 2019].</a:t>
+            </a:r>
+          </a:p>
+          <a:p>
+            <a:r>
+              <a:rPr lang="en-US" dirty="0"/>
+              <a:t>D. Eggers, W., Malik, N. and </a:t>
+            </a:r>
+            <a:r>
+              <a:rPr lang="en-US" dirty="0" err="1"/>
+              <a:t>Graciee</a:t>
+            </a:r>
+            <a:r>
+              <a:rPr lang="en-US" dirty="0"/>
+              <a:t>, M. (2019). </a:t>
+            </a:r>
+            <a:r>
+              <a:rPr lang="en-US" i="1" dirty="0"/>
+              <a:t>Using AI to unleash the power of unstructured government data</a:t>
+            </a:r>
+            <a:r>
+              <a:rPr lang="en-US" dirty="0"/>
+              <a:t>. [online] Deloitte Insights. Available at: https://www2.deloitte.com/insights/us/en/focus/cognitive-technologies/natural-language-processing-examples-in-government-data.html [Accessed 24 May 2019].</a:t>
+            </a:r>
+          </a:p>
+          <a:p>
+            <a:r>
+              <a:rPr lang="en-US" dirty="0" err="1"/>
+              <a:t>D.Manning</a:t>
+            </a:r>
+            <a:r>
+              <a:rPr lang="en-US" dirty="0"/>
+              <a:t>, C. (2011). </a:t>
+            </a:r>
+            <a:r>
+              <a:rPr lang="en-US" i="1" dirty="0"/>
+              <a:t>Part-of-Speech Tagging from 97% to 100%: Is It Time for Some Linguistics?</a:t>
+            </a:r>
+            <a:r>
+              <a:rPr lang="en-US" dirty="0"/>
+              <a:t>. [</a:t>
+            </a:r>
+            <a:r>
+              <a:rPr lang="en-US" dirty="0" err="1"/>
+              <a:t>ebook</a:t>
+            </a:r>
+            <a:r>
+              <a:rPr lang="en-US" dirty="0"/>
+              <a:t>] Stanford: Department of Linguistics , Stanford University. Available at: https://nlp.stanford.edu/pubs/CICLing2011-manning-tagging.pdf [Accessed 20 Apr. 2019].</a:t>
+            </a:r>
+          </a:p>
+          <a:p>
             <a:endParaRPr lang="en-US" sz="2000" dirty="0"/>
           </a:p>
         </p:txBody>
@@ -8442,7 +8762,7 @@
           <p:nvPr/>
         </p:nvPicPr>
         <p:blipFill>
-          <a:blip r:embed="rId8">
+          <a:blip r:embed="rId7">
             <a:extLst>
               <a:ext uri="{28A0092B-C50C-407E-A947-70E740481C1C}">
                 <a14:useLocalDpi xmlns:a14="http://schemas.microsoft.com/office/drawing/2010/main" val="0"/>
@@ -8476,24 +8796,6 @@
       </p:pic>
       <p:sp>
         <p:nvSpPr>
-          <p:cNvPr id="9" name="Picture Placeholder 8">
-            <a:extLst>
-              <a:ext uri="{FF2B5EF4-FFF2-40B4-BE49-F238E27FC236}">
-                <a16:creationId xmlns:a16="http://schemas.microsoft.com/office/drawing/2014/main" id="{DB87E9A5-B883-485C-A62F-823B1D99CDBA}"/>
-              </a:ext>
-            </a:extLst>
-          </p:cNvPr>
-          <p:cNvSpPr>
-            <a:spLocks noGrp="1"/>
-          </p:cNvSpPr>
-          <p:nvPr>
-            <p:ph type="pic" sz="quarter" idx="43"/>
-          </p:nvPr>
-        </p:nvSpPr>
-        <p:spPr/>
-      </p:sp>
-      <p:sp>
-        <p:nvSpPr>
           <p:cNvPr id="14" name="Text Placeholder 13">
             <a:extLst>
               <a:ext uri="{FF2B5EF4-FFF2-40B4-BE49-F238E27FC236}">
@@ -8510,7 +8812,7 @@
         </p:nvSpPr>
         <p:spPr>
           <a:xfrm>
-            <a:off x="30027478" y="5397678"/>
+            <a:off x="29900563" y="5375159"/>
             <a:ext cx="12801600" cy="1437456"/>
           </a:xfrm>
         </p:spPr>
@@ -8520,7 +8822,7 @@
           <a:p>
             <a:r>
               <a:rPr lang="en-US" dirty="0"/>
-              <a:t>Research Questions</a:t>
+              <a:t>Results and Analysis</a:t>
             </a:r>
             <a:endParaRPr lang="en-GB" dirty="0"/>
           </a:p>
@@ -8540,8 +8842,8 @@
         </p:nvSpPr>
         <p:spPr>
           <a:xfrm>
-            <a:off x="14704141" y="12128036"/>
-            <a:ext cx="14350180" cy="5016758"/>
+            <a:off x="14331742" y="12231211"/>
+            <a:ext cx="14350181" cy="5632311"/>
           </a:xfrm>
           <a:prstGeom prst="rect">
             <a:avLst/>
@@ -8571,7 +8873,7 @@
                 <a:latin typeface="Dubai Medium" panose="020B0603030403030204" pitchFamily="34" charset="-78"/>
                 <a:cs typeface="Dubai Medium" panose="020B0603030403030204" pitchFamily="34" charset="-78"/>
               </a:rPr>
-              <a:t>The core methodology consists of the following; The core concepts and ideas to be discussed during the interviews are prepared and sent to all participants a few weeks before the actual interview. During the interview, the interviewee may follow the provide document or discuss different insights related to the core concept. Once all Interviews are completed, all transcripts will be coded and undergo thematic analysis to extract the key insights that are relevant to the research propositions.</a:t>
+              <a:t>.When executed the python program will look up all the articles and load their content locally. Next, the text is keyed, separated word by word for future processing by using the Natural Language Tool Kit (NLTK). NLTK is a suite of libraries that is utilised for Symbolic and Statistical Natural language processing designed for Python. The article content than undergoes Part-of-speech tagging analysis.  The accuracy is then calculated by comparing the actual amount of tagged words in the article with the number of tags given by the python program.</a:t>
             </a:r>
             <a:endParaRPr lang="en-US" sz="4000" dirty="0" err="1">
               <a:latin typeface="Dubai Medium" panose="020B0603030403030204" pitchFamily="34" charset="-78"/>
@@ -8580,12 +8882,42 @@
           </a:p>
         </p:txBody>
       </p:sp>
+      <p:sp>
+        <p:nvSpPr>
+          <p:cNvPr id="8" name="Content Placeholder 7">
+            <a:extLst>
+              <a:ext uri="{FF2B5EF4-FFF2-40B4-BE49-F238E27FC236}">
+                <a16:creationId xmlns:a16="http://schemas.microsoft.com/office/drawing/2014/main" id="{E873FBF6-F735-4BDF-BAE7-5A9F9A6EA77E}"/>
+              </a:ext>
+            </a:extLst>
+          </p:cNvPr>
+          <p:cNvSpPr>
+            <a:spLocks noGrp="1"/>
+          </p:cNvSpPr>
+          <p:nvPr>
+            <p:ph sz="quarter" idx="33"/>
+          </p:nvPr>
+        </p:nvSpPr>
+        <p:spPr>
+          <a:xfrm>
+            <a:off x="29900563" y="18000243"/>
+            <a:ext cx="12801600" cy="3790657"/>
+          </a:xfrm>
+        </p:spPr>
+        <p:txBody>
+          <a:bodyPr/>
+          <a:lstStyle/>
+          <a:p>
+            <a:endParaRPr lang="en-US" dirty="0"/>
+          </a:p>
+        </p:txBody>
+      </p:sp>
       <p:pic>
         <p:nvPicPr>
-          <p:cNvPr id="64" name="Content Placeholder 63">
+          <p:cNvPr id="66" name="Content Placeholder 65" descr="A picture containing text, map&#10;&#10;Description automatically generated">
             <a:extLst>
               <a:ext uri="{FF2B5EF4-FFF2-40B4-BE49-F238E27FC236}">
-                <a16:creationId xmlns:a16="http://schemas.microsoft.com/office/drawing/2014/main" id="{B78BE7E6-9482-45F4-AD9D-2E18AB9D64A4}"/>
+                <a16:creationId xmlns:a16="http://schemas.microsoft.com/office/drawing/2014/main" id="{F58336C4-F639-455B-B4C9-217C9B43A38D}"/>
               </a:ext>
             </a:extLst>
           </p:cNvPr>
@@ -8597,7 +8929,7 @@
           </p:nvPr>
         </p:nvPicPr>
         <p:blipFill>
-          <a:blip r:embed="rId9">
+          <a:blip r:embed="rId8">
             <a:extLst>
               <a:ext uri="{28A0092B-C50C-407E-A947-70E740481C1C}">
                 <a14:useLocalDpi xmlns:a14="http://schemas.microsoft.com/office/drawing/2010/main" val="0"/>
@@ -8610,11 +8942,337 @@
         </p:blipFill>
         <p:spPr>
           <a:xfrm>
-            <a:off x="29900563" y="10591056"/>
-            <a:ext cx="12729379" cy="7315200"/>
+            <a:off x="14704141" y="17938796"/>
+            <a:ext cx="14350181" cy="12952170"/>
           </a:xfrm>
         </p:spPr>
       </p:pic>
+      <p:sp>
+        <p:nvSpPr>
+          <p:cNvPr id="26" name="Text Placeholder 13">
+            <a:extLst>
+              <a:ext uri="{FF2B5EF4-FFF2-40B4-BE49-F238E27FC236}">
+                <a16:creationId xmlns:a16="http://schemas.microsoft.com/office/drawing/2014/main" id="{6127D474-BF64-4B02-AC13-64C00A60C760}"/>
+              </a:ext>
+            </a:extLst>
+          </p:cNvPr>
+          <p:cNvSpPr txBox="1">
+            <a:spLocks/>
+          </p:cNvSpPr>
+          <p:nvPr/>
+        </p:nvSpPr>
+        <p:spPr>
+          <a:xfrm>
+            <a:off x="29900563" y="16426066"/>
+            <a:ext cx="12801600" cy="1437456"/>
+          </a:xfrm>
+          <a:prstGeom prst="rect">
+            <a:avLst/>
+          </a:prstGeom>
+          <a:gradFill>
+            <a:gsLst>
+              <a:gs pos="0">
+                <a:schemeClr val="tx1">
+                  <a:lumMod val="65000"/>
+                  <a:lumOff val="35000"/>
+                </a:schemeClr>
+              </a:gs>
+              <a:gs pos="91000">
+                <a:schemeClr val="accent1"/>
+              </a:gs>
+              <a:gs pos="90000">
+                <a:schemeClr val="tx1">
+                  <a:lumMod val="65000"/>
+                  <a:lumOff val="35000"/>
+                </a:schemeClr>
+              </a:gs>
+              <a:gs pos="100000">
+                <a:schemeClr val="accent1"/>
+              </a:gs>
+            </a:gsLst>
+            <a:lin ang="5400000" scaled="1"/>
+          </a:gradFill>
+        </p:spPr>
+        <p:txBody>
+          <a:bodyPr vert="horz" lIns="365760" tIns="45720" rIns="91440" bIns="45720" rtlCol="0" anchor="ctr">
+            <a:noAutofit/>
+          </a:bodyPr>
+          <a:lstStyle>
+            <a:lvl1pPr marL="0" indent="0" algn="ctr" defTabSz="4389120" rtl="0" eaLnBrk="1" latinLnBrk="0" hangingPunct="1">
+              <a:lnSpc>
+                <a:spcPct val="100000"/>
+              </a:lnSpc>
+              <a:spcBef>
+                <a:spcPts val="0"/>
+              </a:spcBef>
+              <a:buClr>
+                <a:schemeClr val="bg1">
+                  <a:lumMod val="65000"/>
+                </a:schemeClr>
+              </a:buClr>
+              <a:buFont typeface="Arial" panose="020B0604020202020204" pitchFamily="34" charset="0"/>
+              <a:buNone/>
+              <a:defRPr sz="5400" kern="1200" cap="none" baseline="0">
+                <a:solidFill>
+                  <a:schemeClr val="bg1"/>
+                </a:solidFill>
+                <a:latin typeface="+mj-lt"/>
+                <a:ea typeface="+mn-ea"/>
+                <a:cs typeface="+mn-cs"/>
+              </a:defRPr>
+            </a:lvl1pPr>
+            <a:lvl2pPr marL="0" indent="0" algn="l" defTabSz="4389120" rtl="0" eaLnBrk="1" latinLnBrk="0" hangingPunct="1">
+              <a:lnSpc>
+                <a:spcPct val="100000"/>
+              </a:lnSpc>
+              <a:spcBef>
+                <a:spcPts val="0"/>
+              </a:spcBef>
+              <a:buClr>
+                <a:schemeClr val="bg1">
+                  <a:lumMod val="65000"/>
+                </a:schemeClr>
+              </a:buClr>
+              <a:buFont typeface="Arial" panose="020B0604020202020204" pitchFamily="34" charset="0"/>
+              <a:buNone/>
+              <a:defRPr sz="6000" kern="1200" cap="all" baseline="0">
+                <a:solidFill>
+                  <a:schemeClr val="bg1"/>
+                </a:solidFill>
+                <a:latin typeface="+mj-lt"/>
+                <a:ea typeface="+mn-ea"/>
+                <a:cs typeface="+mn-cs"/>
+              </a:defRPr>
+            </a:lvl2pPr>
+            <a:lvl3pPr marL="0" indent="0" algn="l" defTabSz="4389120" rtl="0" eaLnBrk="1" latinLnBrk="0" hangingPunct="1">
+              <a:lnSpc>
+                <a:spcPct val="100000"/>
+              </a:lnSpc>
+              <a:spcBef>
+                <a:spcPts val="0"/>
+              </a:spcBef>
+              <a:buClr>
+                <a:schemeClr val="bg1">
+                  <a:lumMod val="65000"/>
+                </a:schemeClr>
+              </a:buClr>
+              <a:buFont typeface="Arial" panose="020B0604020202020204" pitchFamily="34" charset="0"/>
+              <a:buNone/>
+              <a:defRPr sz="6000" kern="1200" cap="all" baseline="0">
+                <a:solidFill>
+                  <a:schemeClr val="bg1"/>
+                </a:solidFill>
+                <a:latin typeface="+mj-lt"/>
+                <a:ea typeface="+mn-ea"/>
+                <a:cs typeface="+mn-cs"/>
+              </a:defRPr>
+            </a:lvl3pPr>
+            <a:lvl4pPr marL="0" indent="0" algn="l" defTabSz="4389120" rtl="0" eaLnBrk="1" latinLnBrk="0" hangingPunct="1">
+              <a:lnSpc>
+                <a:spcPct val="100000"/>
+              </a:lnSpc>
+              <a:spcBef>
+                <a:spcPts val="0"/>
+              </a:spcBef>
+              <a:buClr>
+                <a:schemeClr val="bg1">
+                  <a:lumMod val="65000"/>
+                </a:schemeClr>
+              </a:buClr>
+              <a:buFont typeface="Arial" panose="020B0604020202020204" pitchFamily="34" charset="0"/>
+              <a:buNone/>
+              <a:defRPr sz="6000" kern="1200" cap="all" baseline="0">
+                <a:solidFill>
+                  <a:schemeClr val="bg1"/>
+                </a:solidFill>
+                <a:latin typeface="+mj-lt"/>
+                <a:ea typeface="+mn-ea"/>
+                <a:cs typeface="+mn-cs"/>
+              </a:defRPr>
+            </a:lvl4pPr>
+            <a:lvl5pPr marL="0" indent="0" algn="l" defTabSz="4389120" rtl="0" eaLnBrk="1" latinLnBrk="0" hangingPunct="1">
+              <a:lnSpc>
+                <a:spcPct val="100000"/>
+              </a:lnSpc>
+              <a:spcBef>
+                <a:spcPts val="0"/>
+              </a:spcBef>
+              <a:buClr>
+                <a:schemeClr val="bg1">
+                  <a:lumMod val="65000"/>
+                </a:schemeClr>
+              </a:buClr>
+              <a:buFont typeface="Arial" panose="020B0604020202020204" pitchFamily="34" charset="0"/>
+              <a:buNone/>
+              <a:defRPr sz="6000" kern="1200" cap="all" baseline="0">
+                <a:solidFill>
+                  <a:schemeClr val="bg1"/>
+                </a:solidFill>
+                <a:latin typeface="+mj-lt"/>
+                <a:ea typeface="+mn-ea"/>
+                <a:cs typeface="+mn-cs"/>
+              </a:defRPr>
+            </a:lvl5pPr>
+            <a:lvl6pPr marL="0" indent="0" algn="l" defTabSz="4389120" rtl="0" eaLnBrk="1" latinLnBrk="0" hangingPunct="1">
+              <a:lnSpc>
+                <a:spcPct val="100000"/>
+              </a:lnSpc>
+              <a:spcBef>
+                <a:spcPts val="0"/>
+              </a:spcBef>
+              <a:buClr>
+                <a:schemeClr val="bg1">
+                  <a:lumMod val="65000"/>
+                </a:schemeClr>
+              </a:buClr>
+              <a:buFont typeface="Arial" panose="020B0604020202020204" pitchFamily="34" charset="0"/>
+              <a:buNone/>
+              <a:defRPr sz="6000" kern="1200" cap="all" baseline="0">
+                <a:solidFill>
+                  <a:schemeClr val="bg1"/>
+                </a:solidFill>
+                <a:latin typeface="+mj-lt"/>
+                <a:ea typeface="+mn-ea"/>
+                <a:cs typeface="+mn-cs"/>
+              </a:defRPr>
+            </a:lvl6pPr>
+            <a:lvl7pPr marL="0" indent="0" algn="l" defTabSz="4389120" rtl="0" eaLnBrk="1" latinLnBrk="0" hangingPunct="1">
+              <a:lnSpc>
+                <a:spcPct val="100000"/>
+              </a:lnSpc>
+              <a:spcBef>
+                <a:spcPts val="0"/>
+              </a:spcBef>
+              <a:buClr>
+                <a:schemeClr val="bg1">
+                  <a:lumMod val="65000"/>
+                </a:schemeClr>
+              </a:buClr>
+              <a:buFont typeface="Arial" panose="020B0604020202020204" pitchFamily="34" charset="0"/>
+              <a:buNone/>
+              <a:defRPr sz="6000" kern="1200" cap="all" baseline="0">
+                <a:solidFill>
+                  <a:schemeClr val="bg1"/>
+                </a:solidFill>
+                <a:latin typeface="+mj-lt"/>
+                <a:ea typeface="+mn-ea"/>
+                <a:cs typeface="+mn-cs"/>
+              </a:defRPr>
+            </a:lvl7pPr>
+            <a:lvl8pPr marL="0" indent="0" algn="l" defTabSz="4389120" rtl="0" eaLnBrk="1" latinLnBrk="0" hangingPunct="1">
+              <a:lnSpc>
+                <a:spcPct val="100000"/>
+              </a:lnSpc>
+              <a:spcBef>
+                <a:spcPts val="0"/>
+              </a:spcBef>
+              <a:buClr>
+                <a:schemeClr val="bg1">
+                  <a:lumMod val="65000"/>
+                </a:schemeClr>
+              </a:buClr>
+              <a:buFont typeface="Arial" panose="020B0604020202020204" pitchFamily="34" charset="0"/>
+              <a:buNone/>
+              <a:defRPr sz="6000" kern="1200" cap="all" baseline="0">
+                <a:solidFill>
+                  <a:schemeClr val="bg1"/>
+                </a:solidFill>
+                <a:latin typeface="+mj-lt"/>
+                <a:ea typeface="+mn-ea"/>
+                <a:cs typeface="+mn-cs"/>
+              </a:defRPr>
+            </a:lvl8pPr>
+            <a:lvl9pPr marL="0" indent="0" algn="l" defTabSz="4389120" rtl="0" eaLnBrk="1" latinLnBrk="0" hangingPunct="1">
+              <a:lnSpc>
+                <a:spcPct val="100000"/>
+              </a:lnSpc>
+              <a:spcBef>
+                <a:spcPts val="0"/>
+              </a:spcBef>
+              <a:buClr>
+                <a:schemeClr val="bg1">
+                  <a:lumMod val="65000"/>
+                </a:schemeClr>
+              </a:buClr>
+              <a:buFont typeface="Arial" panose="020B0604020202020204" pitchFamily="34" charset="0"/>
+              <a:buNone/>
+              <a:defRPr sz="6000" kern="1200" cap="all" baseline="0">
+                <a:solidFill>
+                  <a:schemeClr val="bg1"/>
+                </a:solidFill>
+                <a:latin typeface="+mj-lt"/>
+                <a:ea typeface="+mn-ea"/>
+                <a:cs typeface="+mn-cs"/>
+              </a:defRPr>
+            </a:lvl9pPr>
+          </a:lstStyle>
+          <a:p>
+            <a:r>
+              <a:rPr lang="en-GB" dirty="0"/>
+              <a:t>C</a:t>
+            </a:r>
+            <a:r>
+              <a:rPr lang="en-US" dirty="0" err="1"/>
+              <a:t>onclusion</a:t>
+            </a:r>
+            <a:endParaRPr lang="en-GB" dirty="0"/>
+          </a:p>
+        </p:txBody>
+      </p:sp>
+      <p:sp>
+        <p:nvSpPr>
+          <p:cNvPr id="71" name="TextBox 70">
+            <a:extLst>
+              <a:ext uri="{FF2B5EF4-FFF2-40B4-BE49-F238E27FC236}">
+                <a16:creationId xmlns:a16="http://schemas.microsoft.com/office/drawing/2014/main" id="{953C4810-4C27-4089-9852-A825F0D0312C}"/>
+              </a:ext>
+            </a:extLst>
+          </p:cNvPr>
+          <p:cNvSpPr txBox="1"/>
+          <p:nvPr/>
+        </p:nvSpPr>
+        <p:spPr>
+          <a:xfrm>
+            <a:off x="25627629" y="30534025"/>
+            <a:ext cx="3756221" cy="523220"/>
+          </a:xfrm>
+          <a:prstGeom prst="rect">
+            <a:avLst/>
+          </a:prstGeom>
+          <a:noFill/>
+        </p:spPr>
+        <p:txBody>
+          <a:bodyPr wrap="none" rtlCol="0">
+            <a:spAutoFit/>
+          </a:bodyPr>
+          <a:lstStyle/>
+          <a:p>
+            <a:r>
+              <a:rPr lang="en-GB" sz="2800" i="1" dirty="0">
+                <a:solidFill>
+                  <a:schemeClr val="tx2">
+                    <a:lumMod val="50000"/>
+                    <a:lumOff val="50000"/>
+                  </a:schemeClr>
+                </a:solidFill>
+                <a:latin typeface="Dubai Light" panose="020B0303030403030204" pitchFamily="34" charset="-78"/>
+                <a:cs typeface="Dubai Light" panose="020B0303030403030204" pitchFamily="34" charset="-78"/>
+              </a:rPr>
+              <a:t>Source : Deloitte Insights</a:t>
+            </a:r>
+            <a:endParaRPr lang="en-US" sz="6000" i="1" dirty="0" err="1">
+              <a:solidFill>
+                <a:schemeClr val="tx2">
+                  <a:lumMod val="50000"/>
+                  <a:lumOff val="50000"/>
+                </a:schemeClr>
+              </a:solidFill>
+              <a:latin typeface="Dubai Light" panose="020B0303030403030204" pitchFamily="34" charset="-78"/>
+              <a:cs typeface="Dubai Light" panose="020B0303030403030204" pitchFamily="34" charset="-78"/>
+            </a:endParaRPr>
+          </a:p>
+        </p:txBody>
+      </p:sp>
     </p:spTree>
     <p:extLst>
       <p:ext uri="{BB962C8B-B14F-4D97-AF65-F5344CB8AC3E}">
@@ -9483,12 +10141,130 @@
 </file>
 
 <file path=customXml/item1.xml><?xml version="1.0" encoding="utf-8"?>
-<?mso-contentType ?>
-<FormTemplates xmlns="http://schemas.microsoft.com/sharepoint/v3/contenttype/forms">
-  <Display>DocumentLibraryForm</Display>
-  <Edit>AssetEditForm</Edit>
-  <New>DocumentLibraryForm</New>
-</FormTemplates>
+<p:properties xmlns:p="http://schemas.microsoft.com/office/2006/metadata/properties" xmlns:xsi="http://www.w3.org/2001/XMLSchema-instance" xmlns:pc="http://schemas.microsoft.com/office/infopath/2007/PartnerControls">
+  <documentManagement>
+    <DirectSourceMarket xmlns="4873beb7-5857-4685-be1f-d57550cc96cc" xsi:nil="true"/>
+    <ApprovalStatus xmlns="4873beb7-5857-4685-be1f-d57550cc96cc">InProgress</ApprovalStatus>
+    <MarketSpecific xmlns="4873beb7-5857-4685-be1f-d57550cc96cc">false</MarketSpecific>
+    <LocComments xmlns="4873beb7-5857-4685-be1f-d57550cc96cc" xsi:nil="true"/>
+    <ThumbnailAssetId xmlns="4873beb7-5857-4685-be1f-d57550cc96cc" xsi:nil="true"/>
+    <PrimaryImageGen xmlns="4873beb7-5857-4685-be1f-d57550cc96cc">true</PrimaryImageGen>
+    <LegacyData xmlns="4873beb7-5857-4685-be1f-d57550cc96cc" xsi:nil="true"/>
+    <LocRecommendedHandoff xmlns="4873beb7-5857-4685-be1f-d57550cc96cc" xsi:nil="true"/>
+    <BusinessGroup xmlns="4873beb7-5857-4685-be1f-d57550cc96cc" xsi:nil="true"/>
+    <BlockPublish xmlns="4873beb7-5857-4685-be1f-d57550cc96cc">false</BlockPublish>
+    <TPFriendlyName xmlns="4873beb7-5857-4685-be1f-d57550cc96cc" xsi:nil="true"/>
+    <NumericId xmlns="4873beb7-5857-4685-be1f-d57550cc96cc" xsi:nil="true"/>
+    <APEditor xmlns="4873beb7-5857-4685-be1f-d57550cc96cc">
+      <UserInfo>
+        <DisplayName/>
+        <AccountId xsi:nil="true"/>
+        <AccountType/>
+      </UserInfo>
+    </APEditor>
+    <SourceTitle xmlns="4873beb7-5857-4685-be1f-d57550cc96cc" xsi:nil="true"/>
+    <OpenTemplate xmlns="4873beb7-5857-4685-be1f-d57550cc96cc">true</OpenTemplate>
+    <UALocComments xmlns="4873beb7-5857-4685-be1f-d57550cc96cc" xsi:nil="true"/>
+    <ParentAssetId xmlns="4873beb7-5857-4685-be1f-d57550cc96cc" xsi:nil="true"/>
+    <IntlLangReviewDate xmlns="4873beb7-5857-4685-be1f-d57550cc96cc" xsi:nil="true"/>
+    <FeatureTagsTaxHTField0 xmlns="4873beb7-5857-4685-be1f-d57550cc96cc">
+      <Terms xmlns="http://schemas.microsoft.com/office/infopath/2007/PartnerControls"/>
+    </FeatureTagsTaxHTField0>
+    <PublishStatusLookup xmlns="4873beb7-5857-4685-be1f-d57550cc96cc">
+      <Value>1669352</Value>
+      <Value>1669523</Value>
+    </PublishStatusLookup>
+    <Providers xmlns="4873beb7-5857-4685-be1f-d57550cc96cc" xsi:nil="true"/>
+    <MachineTranslated xmlns="4873beb7-5857-4685-be1f-d57550cc96cc">false</MachineTranslated>
+    <OriginalSourceMarket xmlns="4873beb7-5857-4685-be1f-d57550cc96cc" xsi:nil="true"/>
+    <APDescription xmlns="4873beb7-5857-4685-be1f-d57550cc96cc" xsi:nil="true"/>
+    <ClipArtFilename xmlns="4873beb7-5857-4685-be1f-d57550cc96cc" xsi:nil="true"/>
+    <ContentItem xmlns="4873beb7-5857-4685-be1f-d57550cc96cc" xsi:nil="true"/>
+    <TPInstallLocation xmlns="4873beb7-5857-4685-be1f-d57550cc96cc" xsi:nil="true"/>
+    <PublishTargets xmlns="4873beb7-5857-4685-be1f-d57550cc96cc">OfficeOnlineVNext</PublishTargets>
+    <TimesCloned xmlns="4873beb7-5857-4685-be1f-d57550cc96cc" xsi:nil="true"/>
+    <AssetStart xmlns="4873beb7-5857-4685-be1f-d57550cc96cc">2013-01-21T10:18:00+00:00</AssetStart>
+    <Provider xmlns="4873beb7-5857-4685-be1f-d57550cc96cc" xsi:nil="true"/>
+    <AcquiredFrom xmlns="4873beb7-5857-4685-be1f-d57550cc96cc">Internal MS</AcquiredFrom>
+    <FriendlyTitle xmlns="4873beb7-5857-4685-be1f-d57550cc96cc" xsi:nil="true"/>
+    <LastHandOff xmlns="4873beb7-5857-4685-be1f-d57550cc96cc" xsi:nil="true"/>
+    <TPClientViewer xmlns="4873beb7-5857-4685-be1f-d57550cc96cc" xsi:nil="true"/>
+    <UACurrentWords xmlns="4873beb7-5857-4685-be1f-d57550cc96cc" xsi:nil="true"/>
+    <ArtSampleDocs xmlns="4873beb7-5857-4685-be1f-d57550cc96cc" xsi:nil="true"/>
+    <UALocRecommendation xmlns="4873beb7-5857-4685-be1f-d57550cc96cc">Localize</UALocRecommendation>
+    <Manager xmlns="4873beb7-5857-4685-be1f-d57550cc96cc" xsi:nil="true"/>
+    <ShowIn xmlns="4873beb7-5857-4685-be1f-d57550cc96cc">Show everywhere</ShowIn>
+    <UANotes xmlns="4873beb7-5857-4685-be1f-d57550cc96cc" xsi:nil="true"/>
+    <TemplateStatus xmlns="4873beb7-5857-4685-be1f-d57550cc96cc">Complete</TemplateStatus>
+    <InternalTagsTaxHTField0 xmlns="4873beb7-5857-4685-be1f-d57550cc96cc">
+      <Terms xmlns="http://schemas.microsoft.com/office/infopath/2007/PartnerControls"/>
+    </InternalTagsTaxHTField0>
+    <CSXHash xmlns="4873beb7-5857-4685-be1f-d57550cc96cc" xsi:nil="true"/>
+    <Downloads xmlns="4873beb7-5857-4685-be1f-d57550cc96cc">0</Downloads>
+    <VoteCount xmlns="4873beb7-5857-4685-be1f-d57550cc96cc" xsi:nil="true"/>
+    <OOCacheId xmlns="4873beb7-5857-4685-be1f-d57550cc96cc" xsi:nil="true"/>
+    <IsDeleted xmlns="4873beb7-5857-4685-be1f-d57550cc96cc">false</IsDeleted>
+    <AssetExpire xmlns="4873beb7-5857-4685-be1f-d57550cc96cc">2029-01-01T08:00:00+00:00</AssetExpire>
+    <DSATActionTaken xmlns="4873beb7-5857-4685-be1f-d57550cc96cc" xsi:nil="true"/>
+    <CSXSubmissionMarket xmlns="4873beb7-5857-4685-be1f-d57550cc96cc" xsi:nil="true"/>
+    <TPExecutable xmlns="4873beb7-5857-4685-be1f-d57550cc96cc" xsi:nil="true"/>
+    <SubmitterId xmlns="4873beb7-5857-4685-be1f-d57550cc96cc" xsi:nil="true"/>
+    <EditorialTags xmlns="4873beb7-5857-4685-be1f-d57550cc96cc" xsi:nil="true"/>
+    <AssetType xmlns="4873beb7-5857-4685-be1f-d57550cc96cc">TP</AssetType>
+    <BugNumber xmlns="4873beb7-5857-4685-be1f-d57550cc96cc" xsi:nil="true"/>
+    <CSXSubmissionDate xmlns="4873beb7-5857-4685-be1f-d57550cc96cc" xsi:nil="true"/>
+    <CSXUpdate xmlns="4873beb7-5857-4685-be1f-d57550cc96cc">false</CSXUpdate>
+    <ApprovalLog xmlns="4873beb7-5857-4685-be1f-d57550cc96cc" xsi:nil="true"/>
+    <Milestone xmlns="4873beb7-5857-4685-be1f-d57550cc96cc" xsi:nil="true"/>
+    <RecommendationsModifier xmlns="4873beb7-5857-4685-be1f-d57550cc96cc" xsi:nil="true"/>
+    <OriginAsset xmlns="4873beb7-5857-4685-be1f-d57550cc96cc" xsi:nil="true"/>
+    <TPComponent xmlns="4873beb7-5857-4685-be1f-d57550cc96cc" xsi:nil="true"/>
+    <AssetId xmlns="4873beb7-5857-4685-be1f-d57550cc96cc">TP104001342</AssetId>
+    <IntlLocPriority xmlns="4873beb7-5857-4685-be1f-d57550cc96cc" xsi:nil="true"/>
+    <PolicheckWords xmlns="4873beb7-5857-4685-be1f-d57550cc96cc" xsi:nil="true"/>
+    <TPLaunchHelpLink xmlns="4873beb7-5857-4685-be1f-d57550cc96cc" xsi:nil="true"/>
+    <TPApplication xmlns="4873beb7-5857-4685-be1f-d57550cc96cc" xsi:nil="true"/>
+    <CrawlForDependencies xmlns="4873beb7-5857-4685-be1f-d57550cc96cc">false</CrawlForDependencies>
+    <HandoffToMSDN xmlns="4873beb7-5857-4685-be1f-d57550cc96cc" xsi:nil="true"/>
+    <PlannedPubDate xmlns="4873beb7-5857-4685-be1f-d57550cc96cc" xsi:nil="true"/>
+    <IntlLangReviewer xmlns="4873beb7-5857-4685-be1f-d57550cc96cc" xsi:nil="true"/>
+    <TrustLevel xmlns="4873beb7-5857-4685-be1f-d57550cc96cc">1 Microsoft Managed Content</TrustLevel>
+    <LocLastLocAttemptVersionLookup xmlns="4873beb7-5857-4685-be1f-d57550cc96cc">875929</LocLastLocAttemptVersionLookup>
+    <IsSearchable xmlns="4873beb7-5857-4685-be1f-d57550cc96cc">true</IsSearchable>
+    <TemplateTemplateType xmlns="4873beb7-5857-4685-be1f-d57550cc96cc">PowerPoint Presentation Template</TemplateTemplateType>
+    <CampaignTagsTaxHTField0 xmlns="4873beb7-5857-4685-be1f-d57550cc96cc">
+      <Terms xmlns="http://schemas.microsoft.com/office/infopath/2007/PartnerControls"/>
+    </CampaignTagsTaxHTField0>
+    <TPNamespace xmlns="4873beb7-5857-4685-be1f-d57550cc96cc" xsi:nil="true"/>
+    <TaxCatchAll xmlns="4873beb7-5857-4685-be1f-d57550cc96cc"/>
+    <Markets xmlns="4873beb7-5857-4685-be1f-d57550cc96cc"/>
+    <UAProjectedTotalWords xmlns="4873beb7-5857-4685-be1f-d57550cc96cc" xsi:nil="true"/>
+    <LocMarketGroupTiers2 xmlns="4873beb7-5857-4685-be1f-d57550cc96cc" xsi:nil="true"/>
+    <IntlLangReview xmlns="4873beb7-5857-4685-be1f-d57550cc96cc">false</IntlLangReview>
+    <OutputCachingOn xmlns="4873beb7-5857-4685-be1f-d57550cc96cc">false</OutputCachingOn>
+    <AverageRating xmlns="4873beb7-5857-4685-be1f-d57550cc96cc" xsi:nil="true"/>
+    <APAuthor xmlns="4873beb7-5857-4685-be1f-d57550cc96cc">
+      <UserInfo>
+        <DisplayName>REDMOND\kristaa</DisplayName>
+        <AccountId>136</AccountId>
+        <AccountType/>
+      </UserInfo>
+    </APAuthor>
+    <LocManualTestRequired xmlns="4873beb7-5857-4685-be1f-d57550cc96cc">false</LocManualTestRequired>
+    <TPCommandLine xmlns="4873beb7-5857-4685-be1f-d57550cc96cc" xsi:nil="true"/>
+    <TPAppVersion xmlns="4873beb7-5857-4685-be1f-d57550cc96cc" xsi:nil="true"/>
+    <EditorialStatus xmlns="4873beb7-5857-4685-be1f-d57550cc96cc">Complete</EditorialStatus>
+    <LastModifiedDateTime xmlns="4873beb7-5857-4685-be1f-d57550cc96cc" xsi:nil="true"/>
+    <ScenarioTagsTaxHTField0 xmlns="4873beb7-5857-4685-be1f-d57550cc96cc">
+      <Terms xmlns="http://schemas.microsoft.com/office/infopath/2007/PartnerControls"/>
+    </ScenarioTagsTaxHTField0>
+    <OriginalRelease xmlns="4873beb7-5857-4685-be1f-d57550cc96cc">15</OriginalRelease>
+    <TPLaunchHelpLinkType xmlns="4873beb7-5857-4685-be1f-d57550cc96cc">Template</TPLaunchHelpLinkType>
+    <LocalizationTagsTaxHTField0 xmlns="4873beb7-5857-4685-be1f-d57550cc96cc">
+      <Terms xmlns="http://schemas.microsoft.com/office/infopath/2007/PartnerControls"/>
+    </LocalizationTagsTaxHTField0>
+  </documentManagement>
+</p:properties>
 </file>
 
 <file path=customXml/item2.xml><?xml version="1.0" encoding="utf-8"?>
@@ -10532,136 +11308,26 @@
 </file>
 
 <file path=customXml/item3.xml><?xml version="1.0" encoding="utf-8"?>
-<p:properties xmlns:p="http://schemas.microsoft.com/office/2006/metadata/properties" xmlns:xsi="http://www.w3.org/2001/XMLSchema-instance" xmlns:pc="http://schemas.microsoft.com/office/infopath/2007/PartnerControls">
-  <documentManagement>
-    <DirectSourceMarket xmlns="4873beb7-5857-4685-be1f-d57550cc96cc" xsi:nil="true"/>
-    <ApprovalStatus xmlns="4873beb7-5857-4685-be1f-d57550cc96cc">InProgress</ApprovalStatus>
-    <MarketSpecific xmlns="4873beb7-5857-4685-be1f-d57550cc96cc">false</MarketSpecific>
-    <LocComments xmlns="4873beb7-5857-4685-be1f-d57550cc96cc" xsi:nil="true"/>
-    <ThumbnailAssetId xmlns="4873beb7-5857-4685-be1f-d57550cc96cc" xsi:nil="true"/>
-    <PrimaryImageGen xmlns="4873beb7-5857-4685-be1f-d57550cc96cc">true</PrimaryImageGen>
-    <LegacyData xmlns="4873beb7-5857-4685-be1f-d57550cc96cc" xsi:nil="true"/>
-    <LocRecommendedHandoff xmlns="4873beb7-5857-4685-be1f-d57550cc96cc" xsi:nil="true"/>
-    <BusinessGroup xmlns="4873beb7-5857-4685-be1f-d57550cc96cc" xsi:nil="true"/>
-    <BlockPublish xmlns="4873beb7-5857-4685-be1f-d57550cc96cc">false</BlockPublish>
-    <TPFriendlyName xmlns="4873beb7-5857-4685-be1f-d57550cc96cc" xsi:nil="true"/>
-    <NumericId xmlns="4873beb7-5857-4685-be1f-d57550cc96cc" xsi:nil="true"/>
-    <APEditor xmlns="4873beb7-5857-4685-be1f-d57550cc96cc">
-      <UserInfo>
-        <DisplayName/>
-        <AccountId xsi:nil="true"/>
-        <AccountType/>
-      </UserInfo>
-    </APEditor>
-    <SourceTitle xmlns="4873beb7-5857-4685-be1f-d57550cc96cc" xsi:nil="true"/>
-    <OpenTemplate xmlns="4873beb7-5857-4685-be1f-d57550cc96cc">true</OpenTemplate>
-    <UALocComments xmlns="4873beb7-5857-4685-be1f-d57550cc96cc" xsi:nil="true"/>
-    <ParentAssetId xmlns="4873beb7-5857-4685-be1f-d57550cc96cc" xsi:nil="true"/>
-    <IntlLangReviewDate xmlns="4873beb7-5857-4685-be1f-d57550cc96cc" xsi:nil="true"/>
-    <FeatureTagsTaxHTField0 xmlns="4873beb7-5857-4685-be1f-d57550cc96cc">
-      <Terms xmlns="http://schemas.microsoft.com/office/infopath/2007/PartnerControls"/>
-    </FeatureTagsTaxHTField0>
-    <PublishStatusLookup xmlns="4873beb7-5857-4685-be1f-d57550cc96cc">
-      <Value>1669352</Value>
-      <Value>1669523</Value>
-    </PublishStatusLookup>
-    <Providers xmlns="4873beb7-5857-4685-be1f-d57550cc96cc" xsi:nil="true"/>
-    <MachineTranslated xmlns="4873beb7-5857-4685-be1f-d57550cc96cc">false</MachineTranslated>
-    <OriginalSourceMarket xmlns="4873beb7-5857-4685-be1f-d57550cc96cc" xsi:nil="true"/>
-    <APDescription xmlns="4873beb7-5857-4685-be1f-d57550cc96cc" xsi:nil="true"/>
-    <ClipArtFilename xmlns="4873beb7-5857-4685-be1f-d57550cc96cc" xsi:nil="true"/>
-    <ContentItem xmlns="4873beb7-5857-4685-be1f-d57550cc96cc" xsi:nil="true"/>
-    <TPInstallLocation xmlns="4873beb7-5857-4685-be1f-d57550cc96cc" xsi:nil="true"/>
-    <PublishTargets xmlns="4873beb7-5857-4685-be1f-d57550cc96cc">OfficeOnlineVNext</PublishTargets>
-    <TimesCloned xmlns="4873beb7-5857-4685-be1f-d57550cc96cc" xsi:nil="true"/>
-    <AssetStart xmlns="4873beb7-5857-4685-be1f-d57550cc96cc">2013-01-21T10:18:00+00:00</AssetStart>
-    <Provider xmlns="4873beb7-5857-4685-be1f-d57550cc96cc" xsi:nil="true"/>
-    <AcquiredFrom xmlns="4873beb7-5857-4685-be1f-d57550cc96cc">Internal MS</AcquiredFrom>
-    <FriendlyTitle xmlns="4873beb7-5857-4685-be1f-d57550cc96cc" xsi:nil="true"/>
-    <LastHandOff xmlns="4873beb7-5857-4685-be1f-d57550cc96cc" xsi:nil="true"/>
-    <TPClientViewer xmlns="4873beb7-5857-4685-be1f-d57550cc96cc" xsi:nil="true"/>
-    <UACurrentWords xmlns="4873beb7-5857-4685-be1f-d57550cc96cc" xsi:nil="true"/>
-    <ArtSampleDocs xmlns="4873beb7-5857-4685-be1f-d57550cc96cc" xsi:nil="true"/>
-    <UALocRecommendation xmlns="4873beb7-5857-4685-be1f-d57550cc96cc">Localize</UALocRecommendation>
-    <Manager xmlns="4873beb7-5857-4685-be1f-d57550cc96cc" xsi:nil="true"/>
-    <ShowIn xmlns="4873beb7-5857-4685-be1f-d57550cc96cc">Show everywhere</ShowIn>
-    <UANotes xmlns="4873beb7-5857-4685-be1f-d57550cc96cc" xsi:nil="true"/>
-    <TemplateStatus xmlns="4873beb7-5857-4685-be1f-d57550cc96cc">Complete</TemplateStatus>
-    <InternalTagsTaxHTField0 xmlns="4873beb7-5857-4685-be1f-d57550cc96cc">
-      <Terms xmlns="http://schemas.microsoft.com/office/infopath/2007/PartnerControls"/>
-    </InternalTagsTaxHTField0>
-    <CSXHash xmlns="4873beb7-5857-4685-be1f-d57550cc96cc" xsi:nil="true"/>
-    <Downloads xmlns="4873beb7-5857-4685-be1f-d57550cc96cc">0</Downloads>
-    <VoteCount xmlns="4873beb7-5857-4685-be1f-d57550cc96cc" xsi:nil="true"/>
-    <OOCacheId xmlns="4873beb7-5857-4685-be1f-d57550cc96cc" xsi:nil="true"/>
-    <IsDeleted xmlns="4873beb7-5857-4685-be1f-d57550cc96cc">false</IsDeleted>
-    <AssetExpire xmlns="4873beb7-5857-4685-be1f-d57550cc96cc">2029-01-01T08:00:00+00:00</AssetExpire>
-    <DSATActionTaken xmlns="4873beb7-5857-4685-be1f-d57550cc96cc" xsi:nil="true"/>
-    <CSXSubmissionMarket xmlns="4873beb7-5857-4685-be1f-d57550cc96cc" xsi:nil="true"/>
-    <TPExecutable xmlns="4873beb7-5857-4685-be1f-d57550cc96cc" xsi:nil="true"/>
-    <SubmitterId xmlns="4873beb7-5857-4685-be1f-d57550cc96cc" xsi:nil="true"/>
-    <EditorialTags xmlns="4873beb7-5857-4685-be1f-d57550cc96cc" xsi:nil="true"/>
-    <AssetType xmlns="4873beb7-5857-4685-be1f-d57550cc96cc">TP</AssetType>
-    <BugNumber xmlns="4873beb7-5857-4685-be1f-d57550cc96cc" xsi:nil="true"/>
-    <CSXSubmissionDate xmlns="4873beb7-5857-4685-be1f-d57550cc96cc" xsi:nil="true"/>
-    <CSXUpdate xmlns="4873beb7-5857-4685-be1f-d57550cc96cc">false</CSXUpdate>
-    <ApprovalLog xmlns="4873beb7-5857-4685-be1f-d57550cc96cc" xsi:nil="true"/>
-    <Milestone xmlns="4873beb7-5857-4685-be1f-d57550cc96cc" xsi:nil="true"/>
-    <RecommendationsModifier xmlns="4873beb7-5857-4685-be1f-d57550cc96cc" xsi:nil="true"/>
-    <OriginAsset xmlns="4873beb7-5857-4685-be1f-d57550cc96cc" xsi:nil="true"/>
-    <TPComponent xmlns="4873beb7-5857-4685-be1f-d57550cc96cc" xsi:nil="true"/>
-    <AssetId xmlns="4873beb7-5857-4685-be1f-d57550cc96cc">TP104001342</AssetId>
-    <IntlLocPriority xmlns="4873beb7-5857-4685-be1f-d57550cc96cc" xsi:nil="true"/>
-    <PolicheckWords xmlns="4873beb7-5857-4685-be1f-d57550cc96cc" xsi:nil="true"/>
-    <TPLaunchHelpLink xmlns="4873beb7-5857-4685-be1f-d57550cc96cc" xsi:nil="true"/>
-    <TPApplication xmlns="4873beb7-5857-4685-be1f-d57550cc96cc" xsi:nil="true"/>
-    <CrawlForDependencies xmlns="4873beb7-5857-4685-be1f-d57550cc96cc">false</CrawlForDependencies>
-    <HandoffToMSDN xmlns="4873beb7-5857-4685-be1f-d57550cc96cc" xsi:nil="true"/>
-    <PlannedPubDate xmlns="4873beb7-5857-4685-be1f-d57550cc96cc" xsi:nil="true"/>
-    <IntlLangReviewer xmlns="4873beb7-5857-4685-be1f-d57550cc96cc" xsi:nil="true"/>
-    <TrustLevel xmlns="4873beb7-5857-4685-be1f-d57550cc96cc">1 Microsoft Managed Content</TrustLevel>
-    <LocLastLocAttemptVersionLookup xmlns="4873beb7-5857-4685-be1f-d57550cc96cc">875929</LocLastLocAttemptVersionLookup>
-    <IsSearchable xmlns="4873beb7-5857-4685-be1f-d57550cc96cc">true</IsSearchable>
-    <TemplateTemplateType xmlns="4873beb7-5857-4685-be1f-d57550cc96cc">PowerPoint Presentation Template</TemplateTemplateType>
-    <CampaignTagsTaxHTField0 xmlns="4873beb7-5857-4685-be1f-d57550cc96cc">
-      <Terms xmlns="http://schemas.microsoft.com/office/infopath/2007/PartnerControls"/>
-    </CampaignTagsTaxHTField0>
-    <TPNamespace xmlns="4873beb7-5857-4685-be1f-d57550cc96cc" xsi:nil="true"/>
-    <TaxCatchAll xmlns="4873beb7-5857-4685-be1f-d57550cc96cc"/>
-    <Markets xmlns="4873beb7-5857-4685-be1f-d57550cc96cc"/>
-    <UAProjectedTotalWords xmlns="4873beb7-5857-4685-be1f-d57550cc96cc" xsi:nil="true"/>
-    <LocMarketGroupTiers2 xmlns="4873beb7-5857-4685-be1f-d57550cc96cc" xsi:nil="true"/>
-    <IntlLangReview xmlns="4873beb7-5857-4685-be1f-d57550cc96cc">false</IntlLangReview>
-    <OutputCachingOn xmlns="4873beb7-5857-4685-be1f-d57550cc96cc">false</OutputCachingOn>
-    <AverageRating xmlns="4873beb7-5857-4685-be1f-d57550cc96cc" xsi:nil="true"/>
-    <APAuthor xmlns="4873beb7-5857-4685-be1f-d57550cc96cc">
-      <UserInfo>
-        <DisplayName>REDMOND\kristaa</DisplayName>
-        <AccountId>136</AccountId>
-        <AccountType/>
-      </UserInfo>
-    </APAuthor>
-    <LocManualTestRequired xmlns="4873beb7-5857-4685-be1f-d57550cc96cc">false</LocManualTestRequired>
-    <TPCommandLine xmlns="4873beb7-5857-4685-be1f-d57550cc96cc" xsi:nil="true"/>
-    <TPAppVersion xmlns="4873beb7-5857-4685-be1f-d57550cc96cc" xsi:nil="true"/>
-    <EditorialStatus xmlns="4873beb7-5857-4685-be1f-d57550cc96cc">Complete</EditorialStatus>
-    <LastModifiedDateTime xmlns="4873beb7-5857-4685-be1f-d57550cc96cc" xsi:nil="true"/>
-    <ScenarioTagsTaxHTField0 xmlns="4873beb7-5857-4685-be1f-d57550cc96cc">
-      <Terms xmlns="http://schemas.microsoft.com/office/infopath/2007/PartnerControls"/>
-    </ScenarioTagsTaxHTField0>
-    <OriginalRelease xmlns="4873beb7-5857-4685-be1f-d57550cc96cc">15</OriginalRelease>
-    <TPLaunchHelpLinkType xmlns="4873beb7-5857-4685-be1f-d57550cc96cc">Template</TPLaunchHelpLinkType>
-    <LocalizationTagsTaxHTField0 xmlns="4873beb7-5857-4685-be1f-d57550cc96cc">
-      <Terms xmlns="http://schemas.microsoft.com/office/infopath/2007/PartnerControls"/>
-    </LocalizationTagsTaxHTField0>
-  </documentManagement>
-</p:properties>
+<?mso-contentType ?>
+<FormTemplates xmlns="http://schemas.microsoft.com/sharepoint/v3/contenttype/forms">
+  <Display>DocumentLibraryForm</Display>
+  <Edit>AssetEditForm</Edit>
+  <New>DocumentLibraryForm</New>
+</FormTemplates>
 </file>
 
 <file path=customXml/itemProps1.xml><?xml version="1.0" encoding="utf-8"?>
-<ds:datastoreItem xmlns:ds="http://schemas.openxmlformats.org/officeDocument/2006/customXml" ds:itemID="{99B7E175-EA31-4EB5-9BCC-A945A8103674}">
+<ds:datastoreItem xmlns:ds="http://schemas.openxmlformats.org/officeDocument/2006/customXml" ds:itemID="{F04C2ADE-A257-45E6-A8A8-A5CFC12AD2E8}">
   <ds:schemaRefs>
-    <ds:schemaRef ds:uri="http://schemas.microsoft.com/sharepoint/v3/contenttype/forms"/>
+    <ds:schemaRef ds:uri="http://schemas.microsoft.com/office/2006/documentManagement/types"/>
+    <ds:schemaRef ds:uri="http://schemas.microsoft.com/office/2006/metadata/properties"/>
+    <ds:schemaRef ds:uri="http://purl.org/dc/elements/1.1/"/>
+    <ds:schemaRef ds:uri="4873beb7-5857-4685-be1f-d57550cc96cc"/>
+    <ds:schemaRef ds:uri="http://purl.org/dc/terms/"/>
+    <ds:schemaRef ds:uri="http://schemas.microsoft.com/office/infopath/2007/PartnerControls"/>
+    <ds:schemaRef ds:uri="http://schemas.openxmlformats.org/package/2006/metadata/core-properties"/>
+    <ds:schemaRef ds:uri="http://www.w3.org/XML/1998/namespace"/>
+    <ds:schemaRef ds:uri="http://purl.org/dc/dcmitype/"/>
   </ds:schemaRefs>
 </ds:datastoreItem>
 </file>
@@ -10685,17 +11351,9 @@
 </file>
 
 <file path=customXml/itemProps3.xml><?xml version="1.0" encoding="utf-8"?>
-<ds:datastoreItem xmlns:ds="http://schemas.openxmlformats.org/officeDocument/2006/customXml" ds:itemID="{F04C2ADE-A257-45E6-A8A8-A5CFC12AD2E8}">
+<ds:datastoreItem xmlns:ds="http://schemas.openxmlformats.org/officeDocument/2006/customXml" ds:itemID="{99B7E175-EA31-4EB5-9BCC-A945A8103674}">
   <ds:schemaRefs>
-    <ds:schemaRef ds:uri="http://schemas.microsoft.com/office/2006/documentManagement/types"/>
-    <ds:schemaRef ds:uri="http://schemas.microsoft.com/office/2006/metadata/properties"/>
-    <ds:schemaRef ds:uri="http://purl.org/dc/elements/1.1/"/>
-    <ds:schemaRef ds:uri="4873beb7-5857-4685-be1f-d57550cc96cc"/>
-    <ds:schemaRef ds:uri="http://purl.org/dc/terms/"/>
-    <ds:schemaRef ds:uri="http://schemas.microsoft.com/office/infopath/2007/PartnerControls"/>
-    <ds:schemaRef ds:uri="http://schemas.openxmlformats.org/package/2006/metadata/core-properties"/>
-    <ds:schemaRef ds:uri="http://www.w3.org/XML/1998/namespace"/>
-    <ds:schemaRef ds:uri="http://purl.org/dc/dcmitype/"/>
+    <ds:schemaRef ds:uri="http://schemas.microsoft.com/sharepoint/v3/contenttype/forms"/>
   </ds:schemaRefs>
 </ds:datastoreItem>
 </file>
</xml_diff>

<commit_message>
Changing of File Types
</commit_message>
<xml_diff>
--- a/Doc/project-poster-template(IBMC) - WIP.pptx
+++ b/Doc/project-poster-template(IBMC) - WIP.pptx
@@ -8538,32 +8538,16 @@
           <a:p>
             <a:r>
               <a:rPr lang="en-GB" i="1" dirty="0"/>
-              <a:t>What are the main benefits of implementing blockchain technology within the pharmaceutical market?</a:t>
-            </a:r>
-            <a:r>
-              <a:rPr lang="en-GB" dirty="0"/>
-              <a:t> </a:t>
+              <a:t>Hypothesis : The program will achieve an accuracy above 90%</a:t>
             </a:r>
           </a:p>
           <a:p>
             <a:r>
               <a:rPr lang="en-GB" i="1" dirty="0"/>
-              <a:t>How feasible is the implementation of blockchain technology in the local market?</a:t>
-            </a:r>
-            <a:r>
-              <a:rPr lang="en-GB" dirty="0"/>
-              <a:t> </a:t>
-            </a:r>
-          </a:p>
-          <a:p>
-            <a:r>
-              <a:rPr lang="en-GB" i="1" dirty="0"/>
-              <a:t>Focusing Purely on the supply chain, can blockchain help solve the locally issues?</a:t>
-            </a:r>
-            <a:r>
-              <a:rPr lang="en-GB" dirty="0"/>
-              <a:t> </a:t>
-            </a:r>
+              <a:t>Null Hypothesis : The program will not achieve the stated accuracy due to malfunction.</a:t>
+            </a:r>
+          </a:p>
+          <a:p>
             <a:endParaRPr lang="en-US" dirty="0"/>
           </a:p>
         </p:txBody>
@@ -8882,36 +8866,609 @@
           </a:p>
         </p:txBody>
       </p:sp>
-      <p:sp>
-        <p:nvSpPr>
-          <p:cNvPr id="8" name="Content Placeholder 7">
+      <p:graphicFrame>
+        <p:nvGraphicFramePr>
+          <p:cNvPr id="6" name="Content Placeholder 5">
             <a:extLst>
               <a:ext uri="{FF2B5EF4-FFF2-40B4-BE49-F238E27FC236}">
-                <a16:creationId xmlns:a16="http://schemas.microsoft.com/office/drawing/2014/main" id="{E873FBF6-F735-4BDF-BAE7-5A9F9A6EA77E}"/>
+                <a16:creationId xmlns:a16="http://schemas.microsoft.com/office/drawing/2014/main" id="{5D62765D-A240-4C3C-A018-DC12BCD06657}"/>
               </a:ext>
             </a:extLst>
           </p:cNvPr>
-          <p:cNvSpPr>
-            <a:spLocks noGrp="1"/>
-          </p:cNvSpPr>
+          <p:cNvGraphicFramePr>
+            <a:graphicFrameLocks noGrp="1"/>
+          </p:cNvGraphicFramePr>
           <p:nvPr>
             <p:ph sz="quarter" idx="33"/>
+            <p:extLst>
+              <p:ext uri="{D42A27DB-BD31-4B8C-83A1-F6EECF244321}">
+                <p14:modId xmlns:p14="http://schemas.microsoft.com/office/powerpoint/2010/main" val="4095719460"/>
+              </p:ext>
+            </p:extLst>
           </p:nvPr>
-        </p:nvSpPr>
-        <p:spPr>
-          <a:xfrm>
-            <a:off x="29900563" y="18000243"/>
-            <a:ext cx="12801600" cy="3790657"/>
-          </a:xfrm>
-        </p:spPr>
-        <p:txBody>
-          <a:bodyPr/>
-          <a:lstStyle/>
-          <a:p>
-            <a:endParaRPr lang="en-US" dirty="0"/>
-          </a:p>
-        </p:txBody>
-      </p:sp>
+        </p:nvGraphicFramePr>
+        <p:xfrm>
+          <a:off x="30588833" y="9314727"/>
+          <a:ext cx="10728961" cy="2634162"/>
+        </p:xfrm>
+        <a:graphic>
+          <a:graphicData uri="http://schemas.openxmlformats.org/drawingml/2006/table">
+            <a:tbl>
+              <a:tblPr firstRow="1" firstCol="1" bandRow="1">
+                <a:tableStyleId>{69012ECD-51FC-41F1-AA8D-1B2483CD663E}</a:tableStyleId>
+              </a:tblPr>
+              <a:tblGrid>
+                <a:gridCol w="1874577">
+                  <a:extLst>
+                    <a:ext uri="{9D8B030D-6E8A-4147-A177-3AD203B41FA5}">
+                      <a16:colId xmlns:a16="http://schemas.microsoft.com/office/drawing/2014/main" val="2493487389"/>
+                    </a:ext>
+                  </a:extLst>
+                </a:gridCol>
+                <a:gridCol w="1914461">
+                  <a:extLst>
+                    <a:ext uri="{9D8B030D-6E8A-4147-A177-3AD203B41FA5}">
+                      <a16:colId xmlns:a16="http://schemas.microsoft.com/office/drawing/2014/main" val="1801976732"/>
+                    </a:ext>
+                  </a:extLst>
+                </a:gridCol>
+                <a:gridCol w="3310423">
+                  <a:extLst>
+                    <a:ext uri="{9D8B030D-6E8A-4147-A177-3AD203B41FA5}">
+                      <a16:colId xmlns:a16="http://schemas.microsoft.com/office/drawing/2014/main" val="3050855282"/>
+                    </a:ext>
+                  </a:extLst>
+                </a:gridCol>
+                <a:gridCol w="3629500">
+                  <a:extLst>
+                    <a:ext uri="{9D8B030D-6E8A-4147-A177-3AD203B41FA5}">
+                      <a16:colId xmlns:a16="http://schemas.microsoft.com/office/drawing/2014/main" val="3851949082"/>
+                    </a:ext>
+                  </a:extLst>
+                </a:gridCol>
+              </a:tblGrid>
+              <a:tr h="593574">
+                <a:tc>
+                  <a:txBody>
+                    <a:bodyPr/>
+                    <a:lstStyle/>
+                    <a:p>
+                      <a:pPr algn="ctr">
+                        <a:spcAft>
+                          <a:spcPts val="0"/>
+                        </a:spcAft>
+                      </a:pPr>
+                      <a:r>
+                        <a:rPr lang="en-US" sz="2800" dirty="0">
+                          <a:effectLst/>
+                        </a:rPr>
+                        <a:t>Word</a:t>
+                      </a:r>
+                      <a:endParaRPr lang="en-US" sz="2800" dirty="0">
+                        <a:effectLst/>
+                        <a:latin typeface="Times New Roman" panose="02020603050405020304" pitchFamily="18" charset="0"/>
+                        <a:ea typeface="SimSun" panose="02010600030101010101" pitchFamily="2" charset="-122"/>
+                      </a:endParaRPr>
+                    </a:p>
+                  </a:txBody>
+                  <a:tcPr marL="68580" marR="68580" marT="0" marB="0"/>
+                </a:tc>
+                <a:tc>
+                  <a:txBody>
+                    <a:bodyPr/>
+                    <a:lstStyle/>
+                    <a:p>
+                      <a:pPr algn="ctr">
+                        <a:spcAft>
+                          <a:spcPts val="0"/>
+                        </a:spcAft>
+                      </a:pPr>
+                      <a:r>
+                        <a:rPr lang="en-US" sz="2800">
+                          <a:effectLst/>
+                        </a:rPr>
+                        <a:t>Program</a:t>
+                      </a:r>
+                      <a:endParaRPr lang="en-US" sz="2800">
+                        <a:effectLst/>
+                        <a:latin typeface="Times New Roman" panose="02020603050405020304" pitchFamily="18" charset="0"/>
+                        <a:ea typeface="SimSun" panose="02010600030101010101" pitchFamily="2" charset="-122"/>
+                      </a:endParaRPr>
+                    </a:p>
+                  </a:txBody>
+                  <a:tcPr marL="68580" marR="68580" marT="0" marB="0"/>
+                </a:tc>
+                <a:tc>
+                  <a:txBody>
+                    <a:bodyPr/>
+                    <a:lstStyle/>
+                    <a:p>
+                      <a:pPr algn="ctr">
+                        <a:spcAft>
+                          <a:spcPts val="0"/>
+                        </a:spcAft>
+                      </a:pPr>
+                      <a:r>
+                        <a:rPr lang="en-US" sz="2800">
+                          <a:effectLst/>
+                        </a:rPr>
+                        <a:t>Manual counting</a:t>
+                      </a:r>
+                      <a:endParaRPr lang="en-US" sz="2800">
+                        <a:effectLst/>
+                        <a:latin typeface="Times New Roman" panose="02020603050405020304" pitchFamily="18" charset="0"/>
+                        <a:ea typeface="SimSun" panose="02010600030101010101" pitchFamily="2" charset="-122"/>
+                      </a:endParaRPr>
+                    </a:p>
+                  </a:txBody>
+                  <a:tcPr marL="68580" marR="68580" marT="0" marB="0"/>
+                </a:tc>
+                <a:tc>
+                  <a:txBody>
+                    <a:bodyPr/>
+                    <a:lstStyle/>
+                    <a:p>
+                      <a:pPr algn="ctr">
+                        <a:spcAft>
+                          <a:spcPts val="0"/>
+                        </a:spcAft>
+                      </a:pPr>
+                      <a:r>
+                        <a:rPr lang="en-US" sz="2800">
+                          <a:effectLst/>
+                        </a:rPr>
+                        <a:t>Percentage Found</a:t>
+                      </a:r>
+                      <a:endParaRPr lang="en-US" sz="2800">
+                        <a:effectLst/>
+                        <a:latin typeface="Times New Roman" panose="02020603050405020304" pitchFamily="18" charset="0"/>
+                        <a:ea typeface="SimSun" panose="02010600030101010101" pitchFamily="2" charset="-122"/>
+                      </a:endParaRPr>
+                    </a:p>
+                  </a:txBody>
+                  <a:tcPr marL="68580" marR="68580" marT="0" marB="0"/>
+                </a:tc>
+                <a:extLst>
+                  <a:ext uri="{0D108BD9-81ED-4DB2-BD59-A6C34878D82A}">
+                    <a16:rowId xmlns:a16="http://schemas.microsoft.com/office/drawing/2014/main" val="612063076"/>
+                  </a:ext>
+                </a:extLst>
+              </a:tr>
+              <a:tr h="593574">
+                <a:tc>
+                  <a:txBody>
+                    <a:bodyPr/>
+                    <a:lstStyle/>
+                    <a:p>
+                      <a:pPr algn="ctr">
+                        <a:spcAft>
+                          <a:spcPts val="0"/>
+                        </a:spcAft>
+                      </a:pPr>
+                      <a:r>
+                        <a:rPr lang="en-US" sz="2800" dirty="0">
+                          <a:effectLst/>
+                        </a:rPr>
+                        <a:t>amazon</a:t>
+                      </a:r>
+                      <a:endParaRPr lang="en-US" sz="2800" dirty="0">
+                        <a:effectLst/>
+                        <a:latin typeface="Times New Roman" panose="02020603050405020304" pitchFamily="18" charset="0"/>
+                        <a:ea typeface="SimSun" panose="02010600030101010101" pitchFamily="2" charset="-122"/>
+                      </a:endParaRPr>
+                    </a:p>
+                  </a:txBody>
+                  <a:tcPr marL="68580" marR="68580" marT="0" marB="0"/>
+                </a:tc>
+                <a:tc>
+                  <a:txBody>
+                    <a:bodyPr/>
+                    <a:lstStyle/>
+                    <a:p>
+                      <a:pPr algn="r">
+                        <a:spcAft>
+                          <a:spcPts val="0"/>
+                        </a:spcAft>
+                      </a:pPr>
+                      <a:r>
+                        <a:rPr lang="en-US" sz="2800">
+                          <a:effectLst/>
+                        </a:rPr>
+                        <a:t>24</a:t>
+                      </a:r>
+                      <a:endParaRPr lang="en-US" sz="2800">
+                        <a:effectLst/>
+                        <a:latin typeface="Times New Roman" panose="02020603050405020304" pitchFamily="18" charset="0"/>
+                        <a:ea typeface="SimSun" panose="02010600030101010101" pitchFamily="2" charset="-122"/>
+                      </a:endParaRPr>
+                    </a:p>
+                  </a:txBody>
+                  <a:tcPr marL="68580" marR="68580" marT="0" marB="0"/>
+                </a:tc>
+                <a:tc>
+                  <a:txBody>
+                    <a:bodyPr/>
+                    <a:lstStyle/>
+                    <a:p>
+                      <a:pPr algn="r">
+                        <a:spcAft>
+                          <a:spcPts val="0"/>
+                        </a:spcAft>
+                      </a:pPr>
+                      <a:r>
+                        <a:rPr lang="en-US" sz="2800">
+                          <a:effectLst/>
+                        </a:rPr>
+                        <a:t>24</a:t>
+                      </a:r>
+                      <a:endParaRPr lang="en-US" sz="2800">
+                        <a:effectLst/>
+                        <a:latin typeface="Times New Roman" panose="02020603050405020304" pitchFamily="18" charset="0"/>
+                        <a:ea typeface="SimSun" panose="02010600030101010101" pitchFamily="2" charset="-122"/>
+                      </a:endParaRPr>
+                    </a:p>
+                  </a:txBody>
+                  <a:tcPr marL="68580" marR="68580" marT="0" marB="0"/>
+                </a:tc>
+                <a:tc>
+                  <a:txBody>
+                    <a:bodyPr/>
+                    <a:lstStyle/>
+                    <a:p>
+                      <a:pPr algn="r">
+                        <a:spcAft>
+                          <a:spcPts val="0"/>
+                        </a:spcAft>
+                      </a:pPr>
+                      <a:r>
+                        <a:rPr lang="en-US" sz="2800">
+                          <a:effectLst/>
+                        </a:rPr>
+                        <a:t>100%</a:t>
+                      </a:r>
+                      <a:endParaRPr lang="en-US" sz="2800">
+                        <a:effectLst/>
+                        <a:latin typeface="Times New Roman" panose="02020603050405020304" pitchFamily="18" charset="0"/>
+                        <a:ea typeface="SimSun" panose="02010600030101010101" pitchFamily="2" charset="-122"/>
+                      </a:endParaRPr>
+                    </a:p>
+                  </a:txBody>
+                  <a:tcPr marL="68580" marR="68580" marT="0" marB="0"/>
+                </a:tc>
+                <a:extLst>
+                  <a:ext uri="{0D108BD9-81ED-4DB2-BD59-A6C34878D82A}">
+                    <a16:rowId xmlns:a16="http://schemas.microsoft.com/office/drawing/2014/main" val="4263133966"/>
+                  </a:ext>
+                </a:extLst>
+              </a:tr>
+              <a:tr h="593574">
+                <a:tc>
+                  <a:txBody>
+                    <a:bodyPr/>
+                    <a:lstStyle/>
+                    <a:p>
+                      <a:pPr algn="ctr">
+                        <a:spcAft>
+                          <a:spcPts val="0"/>
+                        </a:spcAft>
+                      </a:pPr>
+                      <a:r>
+                        <a:rPr lang="en-US" sz="2800" dirty="0">
+                          <a:effectLst/>
+                        </a:rPr>
+                        <a:t>approval</a:t>
+                      </a:r>
+                      <a:endParaRPr lang="en-US" sz="2800" dirty="0">
+                        <a:effectLst/>
+                        <a:latin typeface="Times New Roman" panose="02020603050405020304" pitchFamily="18" charset="0"/>
+                        <a:ea typeface="SimSun" panose="02010600030101010101" pitchFamily="2" charset="-122"/>
+                      </a:endParaRPr>
+                    </a:p>
+                  </a:txBody>
+                  <a:tcPr marL="68580" marR="68580" marT="0" marB="0"/>
+                </a:tc>
+                <a:tc>
+                  <a:txBody>
+                    <a:bodyPr/>
+                    <a:lstStyle/>
+                    <a:p>
+                      <a:pPr algn="r">
+                        <a:spcAft>
+                          <a:spcPts val="0"/>
+                        </a:spcAft>
+                      </a:pPr>
+                      <a:r>
+                        <a:rPr lang="en-US" sz="2800">
+                          <a:effectLst/>
+                        </a:rPr>
+                        <a:t>2</a:t>
+                      </a:r>
+                      <a:endParaRPr lang="en-US" sz="2800">
+                        <a:effectLst/>
+                        <a:latin typeface="Times New Roman" panose="02020603050405020304" pitchFamily="18" charset="0"/>
+                        <a:ea typeface="SimSun" panose="02010600030101010101" pitchFamily="2" charset="-122"/>
+                      </a:endParaRPr>
+                    </a:p>
+                  </a:txBody>
+                  <a:tcPr marL="68580" marR="68580" marT="0" marB="0"/>
+                </a:tc>
+                <a:tc>
+                  <a:txBody>
+                    <a:bodyPr/>
+                    <a:lstStyle/>
+                    <a:p>
+                      <a:pPr algn="r">
+                        <a:spcAft>
+                          <a:spcPts val="0"/>
+                        </a:spcAft>
+                      </a:pPr>
+                      <a:r>
+                        <a:rPr lang="en-US" sz="2800">
+                          <a:effectLst/>
+                        </a:rPr>
+                        <a:t>2</a:t>
+                      </a:r>
+                      <a:endParaRPr lang="en-US" sz="2800">
+                        <a:effectLst/>
+                        <a:latin typeface="Times New Roman" panose="02020603050405020304" pitchFamily="18" charset="0"/>
+                        <a:ea typeface="SimSun" panose="02010600030101010101" pitchFamily="2" charset="-122"/>
+                      </a:endParaRPr>
+                    </a:p>
+                  </a:txBody>
+                  <a:tcPr marL="68580" marR="68580" marT="0" marB="0"/>
+                </a:tc>
+                <a:tc>
+                  <a:txBody>
+                    <a:bodyPr/>
+                    <a:lstStyle/>
+                    <a:p>
+                      <a:pPr algn="r">
+                        <a:spcAft>
+                          <a:spcPts val="0"/>
+                        </a:spcAft>
+                      </a:pPr>
+                      <a:r>
+                        <a:rPr lang="en-US" sz="2800">
+                          <a:effectLst/>
+                        </a:rPr>
+                        <a:t>100%</a:t>
+                      </a:r>
+                      <a:endParaRPr lang="en-US" sz="2800">
+                        <a:effectLst/>
+                        <a:latin typeface="Times New Roman" panose="02020603050405020304" pitchFamily="18" charset="0"/>
+                        <a:ea typeface="SimSun" panose="02010600030101010101" pitchFamily="2" charset="-122"/>
+                      </a:endParaRPr>
+                    </a:p>
+                  </a:txBody>
+                  <a:tcPr marL="68580" marR="68580" marT="0" marB="0"/>
+                </a:tc>
+                <a:extLst>
+                  <a:ext uri="{0D108BD9-81ED-4DB2-BD59-A6C34878D82A}">
+                    <a16:rowId xmlns:a16="http://schemas.microsoft.com/office/drawing/2014/main" val="2979965880"/>
+                  </a:ext>
+                </a:extLst>
+              </a:tr>
+              <a:tr h="370984">
+                <a:tc>
+                  <a:txBody>
+                    <a:bodyPr/>
+                    <a:lstStyle/>
+                    <a:p>
+                      <a:pPr algn="ctr">
+                        <a:spcAft>
+                          <a:spcPts val="0"/>
+                        </a:spcAft>
+                      </a:pPr>
+                      <a:r>
+                        <a:rPr lang="en-US" sz="2800" dirty="0">
+                          <a:effectLst/>
+                        </a:rPr>
+                        <a:t>prime</a:t>
+                      </a:r>
+                      <a:endParaRPr lang="en-US" sz="2800" dirty="0">
+                        <a:effectLst/>
+                        <a:latin typeface="Times New Roman" panose="02020603050405020304" pitchFamily="18" charset="0"/>
+                        <a:ea typeface="SimSun" panose="02010600030101010101" pitchFamily="2" charset="-122"/>
+                      </a:endParaRPr>
+                    </a:p>
+                  </a:txBody>
+                  <a:tcPr marL="68580" marR="68580" marT="0" marB="0"/>
+                </a:tc>
+                <a:tc>
+                  <a:txBody>
+                    <a:bodyPr/>
+                    <a:lstStyle/>
+                    <a:p>
+                      <a:pPr algn="r">
+                        <a:spcAft>
+                          <a:spcPts val="0"/>
+                        </a:spcAft>
+                      </a:pPr>
+                      <a:r>
+                        <a:rPr lang="en-US" sz="2800" dirty="0">
+                          <a:effectLst/>
+                        </a:rPr>
+                        <a:t>9</a:t>
+                      </a:r>
+                      <a:endParaRPr lang="en-US" sz="2800" dirty="0">
+                        <a:effectLst/>
+                        <a:latin typeface="Times New Roman" panose="02020603050405020304" pitchFamily="18" charset="0"/>
+                        <a:ea typeface="SimSun" panose="02010600030101010101" pitchFamily="2" charset="-122"/>
+                      </a:endParaRPr>
+                    </a:p>
+                  </a:txBody>
+                  <a:tcPr marL="68580" marR="68580" marT="0" marB="0"/>
+                </a:tc>
+                <a:tc>
+                  <a:txBody>
+                    <a:bodyPr/>
+                    <a:lstStyle/>
+                    <a:p>
+                      <a:pPr algn="r">
+                        <a:spcAft>
+                          <a:spcPts val="0"/>
+                        </a:spcAft>
+                      </a:pPr>
+                      <a:r>
+                        <a:rPr lang="en-US" sz="2800">
+                          <a:effectLst/>
+                        </a:rPr>
+                        <a:t>6</a:t>
+                      </a:r>
+                      <a:endParaRPr lang="en-US" sz="2800">
+                        <a:effectLst/>
+                        <a:latin typeface="Times New Roman" panose="02020603050405020304" pitchFamily="18" charset="0"/>
+                        <a:ea typeface="SimSun" panose="02010600030101010101" pitchFamily="2" charset="-122"/>
+                      </a:endParaRPr>
+                    </a:p>
+                  </a:txBody>
+                  <a:tcPr marL="68580" marR="68580" marT="0" marB="0"/>
+                </a:tc>
+                <a:tc>
+                  <a:txBody>
+                    <a:bodyPr/>
+                    <a:lstStyle/>
+                    <a:p>
+                      <a:pPr algn="r">
+                        <a:spcAft>
+                          <a:spcPts val="0"/>
+                        </a:spcAft>
+                      </a:pPr>
+                      <a:r>
+                        <a:rPr lang="en-US" sz="2800">
+                          <a:effectLst/>
+                          <a:highlight>
+                            <a:srgbClr val="FFFF00"/>
+                          </a:highlight>
+                        </a:rPr>
+                        <a:t>150%</a:t>
+                      </a:r>
+                      <a:endParaRPr lang="en-US" sz="2800">
+                        <a:effectLst/>
+                        <a:latin typeface="Times New Roman" panose="02020603050405020304" pitchFamily="18" charset="0"/>
+                        <a:ea typeface="SimSun" panose="02010600030101010101" pitchFamily="2" charset="-122"/>
+                      </a:endParaRPr>
+                    </a:p>
+                  </a:txBody>
+                  <a:tcPr marL="68580" marR="68580" marT="0" marB="0"/>
+                </a:tc>
+                <a:extLst>
+                  <a:ext uri="{0D108BD9-81ED-4DB2-BD59-A6C34878D82A}">
+                    <a16:rowId xmlns:a16="http://schemas.microsoft.com/office/drawing/2014/main" val="1029157169"/>
+                  </a:ext>
+                </a:extLst>
+              </a:tr>
+              <a:tr h="370984">
+                <a:tc>
+                  <a:txBody>
+                    <a:bodyPr/>
+                    <a:lstStyle/>
+                    <a:p>
+                      <a:pPr algn="ctr">
+                        <a:spcAft>
+                          <a:spcPts val="0"/>
+                        </a:spcAft>
+                      </a:pPr>
+                      <a:r>
+                        <a:rPr lang="en-US" sz="2800">
+                          <a:effectLst/>
+                        </a:rPr>
+                        <a:t>fly </a:t>
+                      </a:r>
+                      <a:endParaRPr lang="en-US" sz="2800">
+                        <a:effectLst/>
+                        <a:latin typeface="Times New Roman" panose="02020603050405020304" pitchFamily="18" charset="0"/>
+                        <a:ea typeface="SimSun" panose="02010600030101010101" pitchFamily="2" charset="-122"/>
+                      </a:endParaRPr>
+                    </a:p>
+                  </a:txBody>
+                  <a:tcPr marL="68580" marR="68580" marT="0" marB="0"/>
+                </a:tc>
+                <a:tc>
+                  <a:txBody>
+                    <a:bodyPr/>
+                    <a:lstStyle/>
+                    <a:p>
+                      <a:pPr algn="r">
+                        <a:spcAft>
+                          <a:spcPts val="0"/>
+                        </a:spcAft>
+                      </a:pPr>
+                      <a:r>
+                        <a:rPr lang="en-US" sz="2800" dirty="0">
+                          <a:effectLst/>
+                        </a:rPr>
+                        <a:t>2</a:t>
+                      </a:r>
+                      <a:endParaRPr lang="en-US" sz="2800" dirty="0">
+                        <a:effectLst/>
+                        <a:latin typeface="Times New Roman" panose="02020603050405020304" pitchFamily="18" charset="0"/>
+                        <a:ea typeface="SimSun" panose="02010600030101010101" pitchFamily="2" charset="-122"/>
+                      </a:endParaRPr>
+                    </a:p>
+                  </a:txBody>
+                  <a:tcPr marL="68580" marR="68580" marT="0" marB="0"/>
+                </a:tc>
+                <a:tc>
+                  <a:txBody>
+                    <a:bodyPr/>
+                    <a:lstStyle/>
+                    <a:p>
+                      <a:pPr algn="r">
+                        <a:spcAft>
+                          <a:spcPts val="0"/>
+                        </a:spcAft>
+                      </a:pPr>
+                      <a:r>
+                        <a:rPr lang="en-US" sz="2800" dirty="0">
+                          <a:effectLst/>
+                        </a:rPr>
+                        <a:t>2</a:t>
+                      </a:r>
+                      <a:endParaRPr lang="en-US" sz="2800" dirty="0">
+                        <a:effectLst/>
+                        <a:latin typeface="Times New Roman" panose="02020603050405020304" pitchFamily="18" charset="0"/>
+                        <a:ea typeface="SimSun" panose="02010600030101010101" pitchFamily="2" charset="-122"/>
+                      </a:endParaRPr>
+                    </a:p>
+                  </a:txBody>
+                  <a:tcPr marL="68580" marR="68580" marT="0" marB="0"/>
+                </a:tc>
+                <a:tc>
+                  <a:txBody>
+                    <a:bodyPr/>
+                    <a:lstStyle/>
+                    <a:p>
+                      <a:pPr algn="r">
+                        <a:spcAft>
+                          <a:spcPts val="0"/>
+                        </a:spcAft>
+                      </a:pPr>
+                      <a:r>
+                        <a:rPr lang="en-US" sz="2800" dirty="0">
+                          <a:effectLst/>
+                        </a:rPr>
+                        <a:t>100%</a:t>
+                      </a:r>
+                      <a:endParaRPr lang="en-US" sz="2800" dirty="0">
+                        <a:effectLst/>
+                        <a:latin typeface="Times New Roman" panose="02020603050405020304" pitchFamily="18" charset="0"/>
+                        <a:ea typeface="SimSun" panose="02010600030101010101" pitchFamily="2" charset="-122"/>
+                      </a:endParaRPr>
+                    </a:p>
+                  </a:txBody>
+                  <a:tcPr marL="68580" marR="68580" marT="0" marB="0"/>
+                </a:tc>
+                <a:extLst>
+                  <a:ext uri="{0D108BD9-81ED-4DB2-BD59-A6C34878D82A}">
+                    <a16:rowId xmlns:a16="http://schemas.microsoft.com/office/drawing/2014/main" val="2104591023"/>
+                  </a:ext>
+                </a:extLst>
+              </a:tr>
+            </a:tbl>
+          </a:graphicData>
+        </a:graphic>
+      </p:graphicFrame>
       <p:pic>
         <p:nvPicPr>
           <p:cNvPr id="66" name="Content Placeholder 65" descr="A picture containing text, map&#10;&#10;Description automatically generated">
@@ -8963,7 +9520,7 @@
         </p:nvSpPr>
         <p:spPr>
           <a:xfrm>
-            <a:off x="29900563" y="16426066"/>
+            <a:off x="29964020" y="16508593"/>
             <a:ext cx="12801600" cy="1437456"/>
           </a:xfrm>
           <a:prstGeom prst="rect">
@@ -9270,6 +9827,89 @@
               <a:latin typeface="Dubai Light" panose="020B0303030403030204" pitchFamily="34" charset="-78"/>
               <a:cs typeface="Dubai Light" panose="020B0303030403030204" pitchFamily="34" charset="-78"/>
             </a:endParaRPr>
+          </a:p>
+        </p:txBody>
+      </p:sp>
+      <p:sp>
+        <p:nvSpPr>
+          <p:cNvPr id="9" name="TextBox 8">
+            <a:extLst>
+              <a:ext uri="{FF2B5EF4-FFF2-40B4-BE49-F238E27FC236}">
+                <a16:creationId xmlns:a16="http://schemas.microsoft.com/office/drawing/2014/main" id="{E38DC1EC-7CF8-4423-97D1-D98DDF772EB8}"/>
+              </a:ext>
+            </a:extLst>
+          </p:cNvPr>
+          <p:cNvSpPr txBox="1"/>
+          <p:nvPr/>
+        </p:nvSpPr>
+        <p:spPr>
+          <a:xfrm>
+            <a:off x="30588833" y="12893996"/>
+            <a:ext cx="11633654" cy="3970318"/>
+          </a:xfrm>
+          <a:prstGeom prst="rect">
+            <a:avLst/>
+          </a:prstGeom>
+          <a:noFill/>
+        </p:spPr>
+        <p:txBody>
+          <a:bodyPr wrap="square" rtlCol="0">
+            <a:spAutoFit/>
+          </a:bodyPr>
+          <a:lstStyle/>
+          <a:p>
+            <a:pPr algn="just"/>
+            <a:r>
+              <a:rPr lang="en-US" sz="3600" dirty="0"/>
+              <a:t>The Test proved successful. The above dataset shows both possible cases when dealing with web scraping. The program managed to find all user-visible text with just a single anomaly, due to the nature of the scraping, the program found the chosen tag in the web-page code ween by the viewer under normal </a:t>
+            </a:r>
+            <a:r>
+              <a:rPr lang="en-US" sz="3600" dirty="0" err="1"/>
+              <a:t>circumstances.hich</a:t>
+            </a:r>
+            <a:r>
+              <a:rPr lang="en-US" sz="3600" dirty="0"/>
+              <a:t> is not s</a:t>
+            </a:r>
+            <a:endParaRPr lang="en-US" dirty="0"/>
+          </a:p>
+        </p:txBody>
+      </p:sp>
+      <p:sp>
+        <p:nvSpPr>
+          <p:cNvPr id="10" name="TextBox 9">
+            <a:extLst>
+              <a:ext uri="{FF2B5EF4-FFF2-40B4-BE49-F238E27FC236}">
+                <a16:creationId xmlns:a16="http://schemas.microsoft.com/office/drawing/2014/main" id="{9159E245-8E27-4676-89BC-9375212B2464}"/>
+              </a:ext>
+            </a:extLst>
+          </p:cNvPr>
+          <p:cNvSpPr txBox="1"/>
+          <p:nvPr/>
+        </p:nvSpPr>
+        <p:spPr>
+          <a:xfrm>
+            <a:off x="30027478" y="18311287"/>
+            <a:ext cx="12674685" cy="3847207"/>
+          </a:xfrm>
+          <a:prstGeom prst="rect">
+            <a:avLst/>
+          </a:prstGeom>
+          <a:noFill/>
+        </p:spPr>
+        <p:txBody>
+          <a:bodyPr wrap="square" rtlCol="0">
+            <a:spAutoFit/>
+          </a:bodyPr>
+          <a:lstStyle/>
+          <a:p>
+            <a:r>
+              <a:rPr lang="en-US" sz="3200" dirty="0"/>
+              <a:t>Hypothesis confirmed, within testing bounds, the program managed to find all words visible to the viewer. In one case it found more due to other page elements not viewable by the viewer. There one will need further tune the application to just scrape the visible information. The situation changes from the site, depending on their web design.  Extrapolating the dataset could have led to further anomaly discovery. </a:t>
+            </a:r>
+          </a:p>
+          <a:p>
+            <a:endParaRPr lang="en-US" sz="2000" dirty="0" err="1"/>
           </a:p>
         </p:txBody>
       </p:sp>
@@ -10141,130 +10781,12 @@
 </file>
 
 <file path=customXml/item1.xml><?xml version="1.0" encoding="utf-8"?>
-<p:properties xmlns:p="http://schemas.microsoft.com/office/2006/metadata/properties" xmlns:xsi="http://www.w3.org/2001/XMLSchema-instance" xmlns:pc="http://schemas.microsoft.com/office/infopath/2007/PartnerControls">
-  <documentManagement>
-    <DirectSourceMarket xmlns="4873beb7-5857-4685-be1f-d57550cc96cc" xsi:nil="true"/>
-    <ApprovalStatus xmlns="4873beb7-5857-4685-be1f-d57550cc96cc">InProgress</ApprovalStatus>
-    <MarketSpecific xmlns="4873beb7-5857-4685-be1f-d57550cc96cc">false</MarketSpecific>
-    <LocComments xmlns="4873beb7-5857-4685-be1f-d57550cc96cc" xsi:nil="true"/>
-    <ThumbnailAssetId xmlns="4873beb7-5857-4685-be1f-d57550cc96cc" xsi:nil="true"/>
-    <PrimaryImageGen xmlns="4873beb7-5857-4685-be1f-d57550cc96cc">true</PrimaryImageGen>
-    <LegacyData xmlns="4873beb7-5857-4685-be1f-d57550cc96cc" xsi:nil="true"/>
-    <LocRecommendedHandoff xmlns="4873beb7-5857-4685-be1f-d57550cc96cc" xsi:nil="true"/>
-    <BusinessGroup xmlns="4873beb7-5857-4685-be1f-d57550cc96cc" xsi:nil="true"/>
-    <BlockPublish xmlns="4873beb7-5857-4685-be1f-d57550cc96cc">false</BlockPublish>
-    <TPFriendlyName xmlns="4873beb7-5857-4685-be1f-d57550cc96cc" xsi:nil="true"/>
-    <NumericId xmlns="4873beb7-5857-4685-be1f-d57550cc96cc" xsi:nil="true"/>
-    <APEditor xmlns="4873beb7-5857-4685-be1f-d57550cc96cc">
-      <UserInfo>
-        <DisplayName/>
-        <AccountId xsi:nil="true"/>
-        <AccountType/>
-      </UserInfo>
-    </APEditor>
-    <SourceTitle xmlns="4873beb7-5857-4685-be1f-d57550cc96cc" xsi:nil="true"/>
-    <OpenTemplate xmlns="4873beb7-5857-4685-be1f-d57550cc96cc">true</OpenTemplate>
-    <UALocComments xmlns="4873beb7-5857-4685-be1f-d57550cc96cc" xsi:nil="true"/>
-    <ParentAssetId xmlns="4873beb7-5857-4685-be1f-d57550cc96cc" xsi:nil="true"/>
-    <IntlLangReviewDate xmlns="4873beb7-5857-4685-be1f-d57550cc96cc" xsi:nil="true"/>
-    <FeatureTagsTaxHTField0 xmlns="4873beb7-5857-4685-be1f-d57550cc96cc">
-      <Terms xmlns="http://schemas.microsoft.com/office/infopath/2007/PartnerControls"/>
-    </FeatureTagsTaxHTField0>
-    <PublishStatusLookup xmlns="4873beb7-5857-4685-be1f-d57550cc96cc">
-      <Value>1669352</Value>
-      <Value>1669523</Value>
-    </PublishStatusLookup>
-    <Providers xmlns="4873beb7-5857-4685-be1f-d57550cc96cc" xsi:nil="true"/>
-    <MachineTranslated xmlns="4873beb7-5857-4685-be1f-d57550cc96cc">false</MachineTranslated>
-    <OriginalSourceMarket xmlns="4873beb7-5857-4685-be1f-d57550cc96cc" xsi:nil="true"/>
-    <APDescription xmlns="4873beb7-5857-4685-be1f-d57550cc96cc" xsi:nil="true"/>
-    <ClipArtFilename xmlns="4873beb7-5857-4685-be1f-d57550cc96cc" xsi:nil="true"/>
-    <ContentItem xmlns="4873beb7-5857-4685-be1f-d57550cc96cc" xsi:nil="true"/>
-    <TPInstallLocation xmlns="4873beb7-5857-4685-be1f-d57550cc96cc" xsi:nil="true"/>
-    <PublishTargets xmlns="4873beb7-5857-4685-be1f-d57550cc96cc">OfficeOnlineVNext</PublishTargets>
-    <TimesCloned xmlns="4873beb7-5857-4685-be1f-d57550cc96cc" xsi:nil="true"/>
-    <AssetStart xmlns="4873beb7-5857-4685-be1f-d57550cc96cc">2013-01-21T10:18:00+00:00</AssetStart>
-    <Provider xmlns="4873beb7-5857-4685-be1f-d57550cc96cc" xsi:nil="true"/>
-    <AcquiredFrom xmlns="4873beb7-5857-4685-be1f-d57550cc96cc">Internal MS</AcquiredFrom>
-    <FriendlyTitle xmlns="4873beb7-5857-4685-be1f-d57550cc96cc" xsi:nil="true"/>
-    <LastHandOff xmlns="4873beb7-5857-4685-be1f-d57550cc96cc" xsi:nil="true"/>
-    <TPClientViewer xmlns="4873beb7-5857-4685-be1f-d57550cc96cc" xsi:nil="true"/>
-    <UACurrentWords xmlns="4873beb7-5857-4685-be1f-d57550cc96cc" xsi:nil="true"/>
-    <ArtSampleDocs xmlns="4873beb7-5857-4685-be1f-d57550cc96cc" xsi:nil="true"/>
-    <UALocRecommendation xmlns="4873beb7-5857-4685-be1f-d57550cc96cc">Localize</UALocRecommendation>
-    <Manager xmlns="4873beb7-5857-4685-be1f-d57550cc96cc" xsi:nil="true"/>
-    <ShowIn xmlns="4873beb7-5857-4685-be1f-d57550cc96cc">Show everywhere</ShowIn>
-    <UANotes xmlns="4873beb7-5857-4685-be1f-d57550cc96cc" xsi:nil="true"/>
-    <TemplateStatus xmlns="4873beb7-5857-4685-be1f-d57550cc96cc">Complete</TemplateStatus>
-    <InternalTagsTaxHTField0 xmlns="4873beb7-5857-4685-be1f-d57550cc96cc">
-      <Terms xmlns="http://schemas.microsoft.com/office/infopath/2007/PartnerControls"/>
-    </InternalTagsTaxHTField0>
-    <CSXHash xmlns="4873beb7-5857-4685-be1f-d57550cc96cc" xsi:nil="true"/>
-    <Downloads xmlns="4873beb7-5857-4685-be1f-d57550cc96cc">0</Downloads>
-    <VoteCount xmlns="4873beb7-5857-4685-be1f-d57550cc96cc" xsi:nil="true"/>
-    <OOCacheId xmlns="4873beb7-5857-4685-be1f-d57550cc96cc" xsi:nil="true"/>
-    <IsDeleted xmlns="4873beb7-5857-4685-be1f-d57550cc96cc">false</IsDeleted>
-    <AssetExpire xmlns="4873beb7-5857-4685-be1f-d57550cc96cc">2029-01-01T08:00:00+00:00</AssetExpire>
-    <DSATActionTaken xmlns="4873beb7-5857-4685-be1f-d57550cc96cc" xsi:nil="true"/>
-    <CSXSubmissionMarket xmlns="4873beb7-5857-4685-be1f-d57550cc96cc" xsi:nil="true"/>
-    <TPExecutable xmlns="4873beb7-5857-4685-be1f-d57550cc96cc" xsi:nil="true"/>
-    <SubmitterId xmlns="4873beb7-5857-4685-be1f-d57550cc96cc" xsi:nil="true"/>
-    <EditorialTags xmlns="4873beb7-5857-4685-be1f-d57550cc96cc" xsi:nil="true"/>
-    <AssetType xmlns="4873beb7-5857-4685-be1f-d57550cc96cc">TP</AssetType>
-    <BugNumber xmlns="4873beb7-5857-4685-be1f-d57550cc96cc" xsi:nil="true"/>
-    <CSXSubmissionDate xmlns="4873beb7-5857-4685-be1f-d57550cc96cc" xsi:nil="true"/>
-    <CSXUpdate xmlns="4873beb7-5857-4685-be1f-d57550cc96cc">false</CSXUpdate>
-    <ApprovalLog xmlns="4873beb7-5857-4685-be1f-d57550cc96cc" xsi:nil="true"/>
-    <Milestone xmlns="4873beb7-5857-4685-be1f-d57550cc96cc" xsi:nil="true"/>
-    <RecommendationsModifier xmlns="4873beb7-5857-4685-be1f-d57550cc96cc" xsi:nil="true"/>
-    <OriginAsset xmlns="4873beb7-5857-4685-be1f-d57550cc96cc" xsi:nil="true"/>
-    <TPComponent xmlns="4873beb7-5857-4685-be1f-d57550cc96cc" xsi:nil="true"/>
-    <AssetId xmlns="4873beb7-5857-4685-be1f-d57550cc96cc">TP104001342</AssetId>
-    <IntlLocPriority xmlns="4873beb7-5857-4685-be1f-d57550cc96cc" xsi:nil="true"/>
-    <PolicheckWords xmlns="4873beb7-5857-4685-be1f-d57550cc96cc" xsi:nil="true"/>
-    <TPLaunchHelpLink xmlns="4873beb7-5857-4685-be1f-d57550cc96cc" xsi:nil="true"/>
-    <TPApplication xmlns="4873beb7-5857-4685-be1f-d57550cc96cc" xsi:nil="true"/>
-    <CrawlForDependencies xmlns="4873beb7-5857-4685-be1f-d57550cc96cc">false</CrawlForDependencies>
-    <HandoffToMSDN xmlns="4873beb7-5857-4685-be1f-d57550cc96cc" xsi:nil="true"/>
-    <PlannedPubDate xmlns="4873beb7-5857-4685-be1f-d57550cc96cc" xsi:nil="true"/>
-    <IntlLangReviewer xmlns="4873beb7-5857-4685-be1f-d57550cc96cc" xsi:nil="true"/>
-    <TrustLevel xmlns="4873beb7-5857-4685-be1f-d57550cc96cc">1 Microsoft Managed Content</TrustLevel>
-    <LocLastLocAttemptVersionLookup xmlns="4873beb7-5857-4685-be1f-d57550cc96cc">875929</LocLastLocAttemptVersionLookup>
-    <IsSearchable xmlns="4873beb7-5857-4685-be1f-d57550cc96cc">true</IsSearchable>
-    <TemplateTemplateType xmlns="4873beb7-5857-4685-be1f-d57550cc96cc">PowerPoint Presentation Template</TemplateTemplateType>
-    <CampaignTagsTaxHTField0 xmlns="4873beb7-5857-4685-be1f-d57550cc96cc">
-      <Terms xmlns="http://schemas.microsoft.com/office/infopath/2007/PartnerControls"/>
-    </CampaignTagsTaxHTField0>
-    <TPNamespace xmlns="4873beb7-5857-4685-be1f-d57550cc96cc" xsi:nil="true"/>
-    <TaxCatchAll xmlns="4873beb7-5857-4685-be1f-d57550cc96cc"/>
-    <Markets xmlns="4873beb7-5857-4685-be1f-d57550cc96cc"/>
-    <UAProjectedTotalWords xmlns="4873beb7-5857-4685-be1f-d57550cc96cc" xsi:nil="true"/>
-    <LocMarketGroupTiers2 xmlns="4873beb7-5857-4685-be1f-d57550cc96cc" xsi:nil="true"/>
-    <IntlLangReview xmlns="4873beb7-5857-4685-be1f-d57550cc96cc">false</IntlLangReview>
-    <OutputCachingOn xmlns="4873beb7-5857-4685-be1f-d57550cc96cc">false</OutputCachingOn>
-    <AverageRating xmlns="4873beb7-5857-4685-be1f-d57550cc96cc" xsi:nil="true"/>
-    <APAuthor xmlns="4873beb7-5857-4685-be1f-d57550cc96cc">
-      <UserInfo>
-        <DisplayName>REDMOND\kristaa</DisplayName>
-        <AccountId>136</AccountId>
-        <AccountType/>
-      </UserInfo>
-    </APAuthor>
-    <LocManualTestRequired xmlns="4873beb7-5857-4685-be1f-d57550cc96cc">false</LocManualTestRequired>
-    <TPCommandLine xmlns="4873beb7-5857-4685-be1f-d57550cc96cc" xsi:nil="true"/>
-    <TPAppVersion xmlns="4873beb7-5857-4685-be1f-d57550cc96cc" xsi:nil="true"/>
-    <EditorialStatus xmlns="4873beb7-5857-4685-be1f-d57550cc96cc">Complete</EditorialStatus>
-    <LastModifiedDateTime xmlns="4873beb7-5857-4685-be1f-d57550cc96cc" xsi:nil="true"/>
-    <ScenarioTagsTaxHTField0 xmlns="4873beb7-5857-4685-be1f-d57550cc96cc">
-      <Terms xmlns="http://schemas.microsoft.com/office/infopath/2007/PartnerControls"/>
-    </ScenarioTagsTaxHTField0>
-    <OriginalRelease xmlns="4873beb7-5857-4685-be1f-d57550cc96cc">15</OriginalRelease>
-    <TPLaunchHelpLinkType xmlns="4873beb7-5857-4685-be1f-d57550cc96cc">Template</TPLaunchHelpLinkType>
-    <LocalizationTagsTaxHTField0 xmlns="4873beb7-5857-4685-be1f-d57550cc96cc">
-      <Terms xmlns="http://schemas.microsoft.com/office/infopath/2007/PartnerControls"/>
-    </LocalizationTagsTaxHTField0>
-  </documentManagement>
-</p:properties>
+<?mso-contentType ?>
+<FormTemplates xmlns="http://schemas.microsoft.com/sharepoint/v3/contenttype/forms">
+  <Display>DocumentLibraryForm</Display>
+  <Edit>AssetEditForm</Edit>
+  <New>DocumentLibraryForm</New>
+</FormTemplates>
 </file>
 
 <file path=customXml/item2.xml><?xml version="1.0" encoding="utf-8"?>
@@ -11308,26 +11830,136 @@
 </file>
 
 <file path=customXml/item3.xml><?xml version="1.0" encoding="utf-8"?>
-<?mso-contentType ?>
-<FormTemplates xmlns="http://schemas.microsoft.com/sharepoint/v3/contenttype/forms">
-  <Display>DocumentLibraryForm</Display>
-  <Edit>AssetEditForm</Edit>
-  <New>DocumentLibraryForm</New>
-</FormTemplates>
+<p:properties xmlns:p="http://schemas.microsoft.com/office/2006/metadata/properties" xmlns:xsi="http://www.w3.org/2001/XMLSchema-instance" xmlns:pc="http://schemas.microsoft.com/office/infopath/2007/PartnerControls">
+  <documentManagement>
+    <DirectSourceMarket xmlns="4873beb7-5857-4685-be1f-d57550cc96cc" xsi:nil="true"/>
+    <ApprovalStatus xmlns="4873beb7-5857-4685-be1f-d57550cc96cc">InProgress</ApprovalStatus>
+    <MarketSpecific xmlns="4873beb7-5857-4685-be1f-d57550cc96cc">false</MarketSpecific>
+    <LocComments xmlns="4873beb7-5857-4685-be1f-d57550cc96cc" xsi:nil="true"/>
+    <ThumbnailAssetId xmlns="4873beb7-5857-4685-be1f-d57550cc96cc" xsi:nil="true"/>
+    <PrimaryImageGen xmlns="4873beb7-5857-4685-be1f-d57550cc96cc">true</PrimaryImageGen>
+    <LegacyData xmlns="4873beb7-5857-4685-be1f-d57550cc96cc" xsi:nil="true"/>
+    <LocRecommendedHandoff xmlns="4873beb7-5857-4685-be1f-d57550cc96cc" xsi:nil="true"/>
+    <BusinessGroup xmlns="4873beb7-5857-4685-be1f-d57550cc96cc" xsi:nil="true"/>
+    <BlockPublish xmlns="4873beb7-5857-4685-be1f-d57550cc96cc">false</BlockPublish>
+    <TPFriendlyName xmlns="4873beb7-5857-4685-be1f-d57550cc96cc" xsi:nil="true"/>
+    <NumericId xmlns="4873beb7-5857-4685-be1f-d57550cc96cc" xsi:nil="true"/>
+    <APEditor xmlns="4873beb7-5857-4685-be1f-d57550cc96cc">
+      <UserInfo>
+        <DisplayName/>
+        <AccountId xsi:nil="true"/>
+        <AccountType/>
+      </UserInfo>
+    </APEditor>
+    <SourceTitle xmlns="4873beb7-5857-4685-be1f-d57550cc96cc" xsi:nil="true"/>
+    <OpenTemplate xmlns="4873beb7-5857-4685-be1f-d57550cc96cc">true</OpenTemplate>
+    <UALocComments xmlns="4873beb7-5857-4685-be1f-d57550cc96cc" xsi:nil="true"/>
+    <ParentAssetId xmlns="4873beb7-5857-4685-be1f-d57550cc96cc" xsi:nil="true"/>
+    <IntlLangReviewDate xmlns="4873beb7-5857-4685-be1f-d57550cc96cc" xsi:nil="true"/>
+    <FeatureTagsTaxHTField0 xmlns="4873beb7-5857-4685-be1f-d57550cc96cc">
+      <Terms xmlns="http://schemas.microsoft.com/office/infopath/2007/PartnerControls"/>
+    </FeatureTagsTaxHTField0>
+    <PublishStatusLookup xmlns="4873beb7-5857-4685-be1f-d57550cc96cc">
+      <Value>1669352</Value>
+      <Value>1669523</Value>
+    </PublishStatusLookup>
+    <Providers xmlns="4873beb7-5857-4685-be1f-d57550cc96cc" xsi:nil="true"/>
+    <MachineTranslated xmlns="4873beb7-5857-4685-be1f-d57550cc96cc">false</MachineTranslated>
+    <OriginalSourceMarket xmlns="4873beb7-5857-4685-be1f-d57550cc96cc" xsi:nil="true"/>
+    <APDescription xmlns="4873beb7-5857-4685-be1f-d57550cc96cc" xsi:nil="true"/>
+    <ClipArtFilename xmlns="4873beb7-5857-4685-be1f-d57550cc96cc" xsi:nil="true"/>
+    <ContentItem xmlns="4873beb7-5857-4685-be1f-d57550cc96cc" xsi:nil="true"/>
+    <TPInstallLocation xmlns="4873beb7-5857-4685-be1f-d57550cc96cc" xsi:nil="true"/>
+    <PublishTargets xmlns="4873beb7-5857-4685-be1f-d57550cc96cc">OfficeOnlineVNext</PublishTargets>
+    <TimesCloned xmlns="4873beb7-5857-4685-be1f-d57550cc96cc" xsi:nil="true"/>
+    <AssetStart xmlns="4873beb7-5857-4685-be1f-d57550cc96cc">2013-01-21T10:18:00+00:00</AssetStart>
+    <Provider xmlns="4873beb7-5857-4685-be1f-d57550cc96cc" xsi:nil="true"/>
+    <AcquiredFrom xmlns="4873beb7-5857-4685-be1f-d57550cc96cc">Internal MS</AcquiredFrom>
+    <FriendlyTitle xmlns="4873beb7-5857-4685-be1f-d57550cc96cc" xsi:nil="true"/>
+    <LastHandOff xmlns="4873beb7-5857-4685-be1f-d57550cc96cc" xsi:nil="true"/>
+    <TPClientViewer xmlns="4873beb7-5857-4685-be1f-d57550cc96cc" xsi:nil="true"/>
+    <UACurrentWords xmlns="4873beb7-5857-4685-be1f-d57550cc96cc" xsi:nil="true"/>
+    <ArtSampleDocs xmlns="4873beb7-5857-4685-be1f-d57550cc96cc" xsi:nil="true"/>
+    <UALocRecommendation xmlns="4873beb7-5857-4685-be1f-d57550cc96cc">Localize</UALocRecommendation>
+    <Manager xmlns="4873beb7-5857-4685-be1f-d57550cc96cc" xsi:nil="true"/>
+    <ShowIn xmlns="4873beb7-5857-4685-be1f-d57550cc96cc">Show everywhere</ShowIn>
+    <UANotes xmlns="4873beb7-5857-4685-be1f-d57550cc96cc" xsi:nil="true"/>
+    <TemplateStatus xmlns="4873beb7-5857-4685-be1f-d57550cc96cc">Complete</TemplateStatus>
+    <InternalTagsTaxHTField0 xmlns="4873beb7-5857-4685-be1f-d57550cc96cc">
+      <Terms xmlns="http://schemas.microsoft.com/office/infopath/2007/PartnerControls"/>
+    </InternalTagsTaxHTField0>
+    <CSXHash xmlns="4873beb7-5857-4685-be1f-d57550cc96cc" xsi:nil="true"/>
+    <Downloads xmlns="4873beb7-5857-4685-be1f-d57550cc96cc">0</Downloads>
+    <VoteCount xmlns="4873beb7-5857-4685-be1f-d57550cc96cc" xsi:nil="true"/>
+    <OOCacheId xmlns="4873beb7-5857-4685-be1f-d57550cc96cc" xsi:nil="true"/>
+    <IsDeleted xmlns="4873beb7-5857-4685-be1f-d57550cc96cc">false</IsDeleted>
+    <AssetExpire xmlns="4873beb7-5857-4685-be1f-d57550cc96cc">2029-01-01T08:00:00+00:00</AssetExpire>
+    <DSATActionTaken xmlns="4873beb7-5857-4685-be1f-d57550cc96cc" xsi:nil="true"/>
+    <CSXSubmissionMarket xmlns="4873beb7-5857-4685-be1f-d57550cc96cc" xsi:nil="true"/>
+    <TPExecutable xmlns="4873beb7-5857-4685-be1f-d57550cc96cc" xsi:nil="true"/>
+    <SubmitterId xmlns="4873beb7-5857-4685-be1f-d57550cc96cc" xsi:nil="true"/>
+    <EditorialTags xmlns="4873beb7-5857-4685-be1f-d57550cc96cc" xsi:nil="true"/>
+    <AssetType xmlns="4873beb7-5857-4685-be1f-d57550cc96cc">TP</AssetType>
+    <BugNumber xmlns="4873beb7-5857-4685-be1f-d57550cc96cc" xsi:nil="true"/>
+    <CSXSubmissionDate xmlns="4873beb7-5857-4685-be1f-d57550cc96cc" xsi:nil="true"/>
+    <CSXUpdate xmlns="4873beb7-5857-4685-be1f-d57550cc96cc">false</CSXUpdate>
+    <ApprovalLog xmlns="4873beb7-5857-4685-be1f-d57550cc96cc" xsi:nil="true"/>
+    <Milestone xmlns="4873beb7-5857-4685-be1f-d57550cc96cc" xsi:nil="true"/>
+    <RecommendationsModifier xmlns="4873beb7-5857-4685-be1f-d57550cc96cc" xsi:nil="true"/>
+    <OriginAsset xmlns="4873beb7-5857-4685-be1f-d57550cc96cc" xsi:nil="true"/>
+    <TPComponent xmlns="4873beb7-5857-4685-be1f-d57550cc96cc" xsi:nil="true"/>
+    <AssetId xmlns="4873beb7-5857-4685-be1f-d57550cc96cc">TP104001342</AssetId>
+    <IntlLocPriority xmlns="4873beb7-5857-4685-be1f-d57550cc96cc" xsi:nil="true"/>
+    <PolicheckWords xmlns="4873beb7-5857-4685-be1f-d57550cc96cc" xsi:nil="true"/>
+    <TPLaunchHelpLink xmlns="4873beb7-5857-4685-be1f-d57550cc96cc" xsi:nil="true"/>
+    <TPApplication xmlns="4873beb7-5857-4685-be1f-d57550cc96cc" xsi:nil="true"/>
+    <CrawlForDependencies xmlns="4873beb7-5857-4685-be1f-d57550cc96cc">false</CrawlForDependencies>
+    <HandoffToMSDN xmlns="4873beb7-5857-4685-be1f-d57550cc96cc" xsi:nil="true"/>
+    <PlannedPubDate xmlns="4873beb7-5857-4685-be1f-d57550cc96cc" xsi:nil="true"/>
+    <IntlLangReviewer xmlns="4873beb7-5857-4685-be1f-d57550cc96cc" xsi:nil="true"/>
+    <TrustLevel xmlns="4873beb7-5857-4685-be1f-d57550cc96cc">1 Microsoft Managed Content</TrustLevel>
+    <LocLastLocAttemptVersionLookup xmlns="4873beb7-5857-4685-be1f-d57550cc96cc">875929</LocLastLocAttemptVersionLookup>
+    <IsSearchable xmlns="4873beb7-5857-4685-be1f-d57550cc96cc">true</IsSearchable>
+    <TemplateTemplateType xmlns="4873beb7-5857-4685-be1f-d57550cc96cc">PowerPoint Presentation Template</TemplateTemplateType>
+    <CampaignTagsTaxHTField0 xmlns="4873beb7-5857-4685-be1f-d57550cc96cc">
+      <Terms xmlns="http://schemas.microsoft.com/office/infopath/2007/PartnerControls"/>
+    </CampaignTagsTaxHTField0>
+    <TPNamespace xmlns="4873beb7-5857-4685-be1f-d57550cc96cc" xsi:nil="true"/>
+    <TaxCatchAll xmlns="4873beb7-5857-4685-be1f-d57550cc96cc"/>
+    <Markets xmlns="4873beb7-5857-4685-be1f-d57550cc96cc"/>
+    <UAProjectedTotalWords xmlns="4873beb7-5857-4685-be1f-d57550cc96cc" xsi:nil="true"/>
+    <LocMarketGroupTiers2 xmlns="4873beb7-5857-4685-be1f-d57550cc96cc" xsi:nil="true"/>
+    <IntlLangReview xmlns="4873beb7-5857-4685-be1f-d57550cc96cc">false</IntlLangReview>
+    <OutputCachingOn xmlns="4873beb7-5857-4685-be1f-d57550cc96cc">false</OutputCachingOn>
+    <AverageRating xmlns="4873beb7-5857-4685-be1f-d57550cc96cc" xsi:nil="true"/>
+    <APAuthor xmlns="4873beb7-5857-4685-be1f-d57550cc96cc">
+      <UserInfo>
+        <DisplayName>REDMOND\kristaa</DisplayName>
+        <AccountId>136</AccountId>
+        <AccountType/>
+      </UserInfo>
+    </APAuthor>
+    <LocManualTestRequired xmlns="4873beb7-5857-4685-be1f-d57550cc96cc">false</LocManualTestRequired>
+    <TPCommandLine xmlns="4873beb7-5857-4685-be1f-d57550cc96cc" xsi:nil="true"/>
+    <TPAppVersion xmlns="4873beb7-5857-4685-be1f-d57550cc96cc" xsi:nil="true"/>
+    <EditorialStatus xmlns="4873beb7-5857-4685-be1f-d57550cc96cc">Complete</EditorialStatus>
+    <LastModifiedDateTime xmlns="4873beb7-5857-4685-be1f-d57550cc96cc" xsi:nil="true"/>
+    <ScenarioTagsTaxHTField0 xmlns="4873beb7-5857-4685-be1f-d57550cc96cc">
+      <Terms xmlns="http://schemas.microsoft.com/office/infopath/2007/PartnerControls"/>
+    </ScenarioTagsTaxHTField0>
+    <OriginalRelease xmlns="4873beb7-5857-4685-be1f-d57550cc96cc">15</OriginalRelease>
+    <TPLaunchHelpLinkType xmlns="4873beb7-5857-4685-be1f-d57550cc96cc">Template</TPLaunchHelpLinkType>
+    <LocalizationTagsTaxHTField0 xmlns="4873beb7-5857-4685-be1f-d57550cc96cc">
+      <Terms xmlns="http://schemas.microsoft.com/office/infopath/2007/PartnerControls"/>
+    </LocalizationTagsTaxHTField0>
+  </documentManagement>
+</p:properties>
 </file>
 
 <file path=customXml/itemProps1.xml><?xml version="1.0" encoding="utf-8"?>
-<ds:datastoreItem xmlns:ds="http://schemas.openxmlformats.org/officeDocument/2006/customXml" ds:itemID="{F04C2ADE-A257-45E6-A8A8-A5CFC12AD2E8}">
+<ds:datastoreItem xmlns:ds="http://schemas.openxmlformats.org/officeDocument/2006/customXml" ds:itemID="{99B7E175-EA31-4EB5-9BCC-A945A8103674}">
   <ds:schemaRefs>
-    <ds:schemaRef ds:uri="http://schemas.microsoft.com/office/2006/documentManagement/types"/>
-    <ds:schemaRef ds:uri="http://schemas.microsoft.com/office/2006/metadata/properties"/>
-    <ds:schemaRef ds:uri="http://purl.org/dc/elements/1.1/"/>
-    <ds:schemaRef ds:uri="4873beb7-5857-4685-be1f-d57550cc96cc"/>
-    <ds:schemaRef ds:uri="http://purl.org/dc/terms/"/>
-    <ds:schemaRef ds:uri="http://schemas.microsoft.com/office/infopath/2007/PartnerControls"/>
-    <ds:schemaRef ds:uri="http://schemas.openxmlformats.org/package/2006/metadata/core-properties"/>
-    <ds:schemaRef ds:uri="http://www.w3.org/XML/1998/namespace"/>
-    <ds:schemaRef ds:uri="http://purl.org/dc/dcmitype/"/>
+    <ds:schemaRef ds:uri="http://schemas.microsoft.com/sharepoint/v3/contenttype/forms"/>
   </ds:schemaRefs>
 </ds:datastoreItem>
 </file>
@@ -11351,9 +11983,17 @@
 </file>
 
 <file path=customXml/itemProps3.xml><?xml version="1.0" encoding="utf-8"?>
-<ds:datastoreItem xmlns:ds="http://schemas.openxmlformats.org/officeDocument/2006/customXml" ds:itemID="{99B7E175-EA31-4EB5-9BCC-A945A8103674}">
+<ds:datastoreItem xmlns:ds="http://schemas.openxmlformats.org/officeDocument/2006/customXml" ds:itemID="{F04C2ADE-A257-45E6-A8A8-A5CFC12AD2E8}">
   <ds:schemaRefs>
-    <ds:schemaRef ds:uri="http://schemas.microsoft.com/sharepoint/v3/contenttype/forms"/>
+    <ds:schemaRef ds:uri="http://purl.org/dc/terms/"/>
+    <ds:schemaRef ds:uri="http://schemas.microsoft.com/office/2006/documentManagement/types"/>
+    <ds:schemaRef ds:uri="http://purl.org/dc/dcmitype/"/>
+    <ds:schemaRef ds:uri="4873beb7-5857-4685-be1f-d57550cc96cc"/>
+    <ds:schemaRef ds:uri="http://schemas.openxmlformats.org/package/2006/metadata/core-properties"/>
+    <ds:schemaRef ds:uri="http://purl.org/dc/elements/1.1/"/>
+    <ds:schemaRef ds:uri="http://schemas.microsoft.com/office/infopath/2007/PartnerControls"/>
+    <ds:schemaRef ds:uri="http://schemas.microsoft.com/office/2006/metadata/properties"/>
+    <ds:schemaRef ds:uri="http://www.w3.org/XML/1998/namespace"/>
   </ds:schemaRefs>
 </ds:datastoreItem>
 </file>
</xml_diff>